<commit_message>
Update UG DG UML diagram
</commit_message>
<xml_diff>
--- a/docs/diagrams/EditNoteFeatureClassDiagram.pptx
+++ b/docs/diagrams/EditNoteFeatureClassDiagram.pptx
@@ -104,6 +104,11 @@
       </a:defRPr>
     </a:lvl9pPr>
   </p:defaultTextStyle>
+  <p:extLst>
+    <p:ext uri="{EFAFB233-063F-42B5-8137-9DF3F51BA10A}">
+      <p15:sldGuideLst xmlns:p15="http://schemas.microsoft.com/office/powerpoint/2012/main"/>
+    </p:ext>
+  </p:extLst>
 </p:presentation>
 </file>
 
@@ -3441,7 +3446,7 @@
         </p:nvSpPr>
         <p:spPr>
           <a:xfrm flipH="1">
-            <a:off x="6973149" y="3057699"/>
+            <a:off x="6973149" y="2874820"/>
             <a:ext cx="1261455" cy="346760"/>
           </a:xfrm>
           <a:prstGeom prst="rect">
@@ -4307,8 +4312,8 @@
         </p:nvCxnSpPr>
         <p:spPr>
           <a:xfrm rot="16200000" flipV="1">
-            <a:off x="8186052" y="3279632"/>
-            <a:ext cx="749397" cy="652291"/>
+            <a:off x="8094612" y="3188192"/>
+            <a:ext cx="932276" cy="652291"/>
           </a:xfrm>
           <a:prstGeom prst="bentConnector2">
             <a:avLst/>
@@ -4345,7 +4350,7 @@
         </p:nvCxnSpPr>
         <p:spPr>
           <a:xfrm flipV="1">
-            <a:off x="6386191" y="3231079"/>
+            <a:off x="6386191" y="3048200"/>
             <a:ext cx="586958" cy="1155"/>
           </a:xfrm>
           <a:prstGeom prst="bentConnector3">
@@ -4460,7 +4465,7 @@
         </p:nvSpPr>
         <p:spPr>
           <a:xfrm rot="16200000" flipH="1">
-            <a:off x="4605596" y="2758702"/>
+            <a:off x="4605596" y="2679191"/>
             <a:ext cx="164426" cy="159908"/>
           </a:xfrm>
           <a:prstGeom prst="triangle">
@@ -4505,7 +4510,7 @@
         </p:nvGrpSpPr>
         <p:grpSpPr>
           <a:xfrm rot="5400000">
-            <a:off x="6593383" y="3145878"/>
+            <a:off x="6593383" y="2962999"/>
             <a:ext cx="222304" cy="598286"/>
             <a:chOff x="3965760" y="592437"/>
             <a:chExt cx="254462" cy="503902"/>
@@ -4652,7 +4657,7 @@
         </p:nvSpPr>
         <p:spPr>
           <a:xfrm flipH="1">
-            <a:off x="5001007" y="3058854"/>
+            <a:off x="5001007" y="2875975"/>
             <a:ext cx="1385184" cy="346760"/>
           </a:xfrm>
           <a:prstGeom prst="rect">
@@ -4729,8 +4734,8 @@
         </p:nvCxnSpPr>
         <p:spPr>
           <a:xfrm flipV="1">
-            <a:off x="5435126" y="3405614"/>
-            <a:ext cx="258473" cy="341631"/>
+            <a:off x="5435126" y="3222735"/>
+            <a:ext cx="258473" cy="524510"/>
           </a:xfrm>
           <a:prstGeom prst="bentConnector2">
             <a:avLst/>
@@ -4774,8 +4779,8 @@
         </p:nvCxnSpPr>
         <p:spPr>
           <a:xfrm>
-            <a:off x="4767763" y="2838656"/>
-            <a:ext cx="233244" cy="393578"/>
+            <a:off x="4767763" y="2759145"/>
+            <a:ext cx="233244" cy="290210"/>
           </a:xfrm>
           <a:prstGeom prst="bentConnector3">
             <a:avLst>
@@ -4820,7 +4825,7 @@
         </p:nvSpPr>
         <p:spPr>
           <a:xfrm flipH="1">
-            <a:off x="4985389" y="2441243"/>
+            <a:off x="4985389" y="2123192"/>
             <a:ext cx="1391559" cy="346760"/>
           </a:xfrm>
           <a:prstGeom prst="rect">
@@ -4902,9 +4907,9 @@
           <p:nvPr/>
         </p:nvCxnSpPr>
         <p:spPr>
-          <a:xfrm>
-            <a:off x="4767763" y="2609421"/>
-            <a:ext cx="217626" cy="5202"/>
+          <a:xfrm flipV="1">
+            <a:off x="4767763" y="2296572"/>
+            <a:ext cx="217626" cy="201532"/>
           </a:xfrm>
           <a:prstGeom prst="bentConnector3">
             <a:avLst>
@@ -4937,10 +4942,10 @@
       </p:cxnSp>
       <p:sp>
         <p:nvSpPr>
-          <p:cNvPr id="84" name="Rectangle 11">
-            <a:extLst>
-              <a:ext uri="{FF2B5EF4-FFF2-40B4-BE49-F238E27FC236}">
-                <a16:creationId xmlns:a16="http://schemas.microsoft.com/office/drawing/2014/main" id="{ADD014D5-717C-45FB-999A-D190C571E04B}"/>
+          <p:cNvPr id="93" name="Isosceles Triangle 102">
+            <a:extLst>
+              <a:ext uri="{FF2B5EF4-FFF2-40B4-BE49-F238E27FC236}">
+                <a16:creationId xmlns:a16="http://schemas.microsoft.com/office/drawing/2014/main" id="{986A9FAB-2A87-46B5-985D-8FE71E1C3375}"/>
               </a:ext>
             </a:extLst>
           </p:cNvPr>
@@ -4948,137 +4953,8 @@
           <p:nvPr/>
         </p:nvSpPr>
         <p:spPr>
-          <a:xfrm flipH="1">
-            <a:off x="4991765" y="1827821"/>
-            <a:ext cx="1385184" cy="346760"/>
-          </a:xfrm>
-          <a:prstGeom prst="rect">
-            <a:avLst/>
-          </a:prstGeom>
-          <a:solidFill>
-            <a:schemeClr val="accent5">
-              <a:alpha val="81000"/>
-            </a:schemeClr>
-          </a:solidFill>
-          <a:ln/>
-          <a:effectLst/>
-        </p:spPr>
-        <p:style>
-          <a:lnRef idx="1">
-            <a:schemeClr val="accent5"/>
-          </a:lnRef>
-          <a:fillRef idx="2">
-            <a:schemeClr val="accent5"/>
-          </a:fillRef>
-          <a:effectRef idx="1">
-            <a:schemeClr val="accent5"/>
-          </a:effectRef>
-          <a:fontRef idx="minor">
-            <a:schemeClr val="dk1"/>
-          </a:fontRef>
-        </p:style>
-        <p:txBody>
-          <a:bodyPr rtlCol="0" anchor="ctr"/>
-          <a:lstStyle/>
-          <a:p>
-            <a:pPr algn="ctr"/>
-            <a:r>
-              <a:rPr lang="en-US" sz="1050" b="1" dirty="0" err="1">
-                <a:solidFill>
-                  <a:schemeClr val="bg1"/>
-                </a:solidFill>
-              </a:rPr>
-              <a:t>DeleteNoteCommand</a:t>
-            </a:r>
-            <a:endParaRPr lang="en-US" sz="1050" b="1" dirty="0">
-              <a:solidFill>
-                <a:schemeClr val="bg1"/>
-              </a:solidFill>
-            </a:endParaRPr>
-          </a:p>
-          <a:p>
-            <a:pPr algn="ctr"/>
-            <a:r>
-              <a:rPr lang="en-US" sz="1050" b="1" dirty="0">
-                <a:solidFill>
-                  <a:schemeClr val="bg1"/>
-                </a:solidFill>
-              </a:rPr>
-              <a:t>Parser</a:t>
-            </a:r>
-            <a:endParaRPr lang="en-SG" sz="1050" b="1" dirty="0">
-              <a:solidFill>
-                <a:schemeClr val="bg1"/>
-              </a:solidFill>
-            </a:endParaRPr>
-          </a:p>
-        </p:txBody>
-      </p:sp>
-      <p:cxnSp>
-        <p:nvCxnSpPr>
-          <p:cNvPr id="90" name="Elbow Connector 82">
-            <a:extLst>
-              <a:ext uri="{FF2B5EF4-FFF2-40B4-BE49-F238E27FC236}">
-                <a16:creationId xmlns:a16="http://schemas.microsoft.com/office/drawing/2014/main" id="{26BB716B-67DF-410F-8813-6ED7B1DC5808}"/>
-              </a:ext>
-            </a:extLst>
-          </p:cNvPr>
-          <p:cNvCxnSpPr>
-            <a:cxnSpLocks/>
-            <a:stCxn id="94" idx="3"/>
-            <a:endCxn id="84" idx="3"/>
-          </p:cNvCxnSpPr>
-          <p:nvPr/>
-        </p:nvCxnSpPr>
-        <p:spPr>
-          <a:xfrm flipV="1">
-            <a:off x="4767763" y="2001201"/>
-            <a:ext cx="224002" cy="355284"/>
-          </a:xfrm>
-          <a:prstGeom prst="bentConnector3">
-            <a:avLst>
-              <a:gd name="adj1" fmla="val 50000"/>
-            </a:avLst>
-          </a:prstGeom>
-          <a:ln>
-            <a:solidFill>
-              <a:schemeClr val="accent5">
-                <a:lumMod val="75000"/>
-              </a:schemeClr>
-            </a:solidFill>
-            <a:prstDash val="sysDot"/>
-          </a:ln>
-        </p:spPr>
-        <p:style>
-          <a:lnRef idx="1">
-            <a:schemeClr val="accent1"/>
-          </a:lnRef>
-          <a:fillRef idx="0">
-            <a:schemeClr val="accent1"/>
-          </a:fillRef>
-          <a:effectRef idx="0">
-            <a:schemeClr val="accent1"/>
-          </a:effectRef>
-          <a:fontRef idx="minor">
-            <a:schemeClr val="tx1"/>
-          </a:fontRef>
-        </p:style>
-      </p:cxnSp>
-      <p:sp>
-        <p:nvSpPr>
-          <p:cNvPr id="93" name="Isosceles Triangle 102">
-            <a:extLst>
-              <a:ext uri="{FF2B5EF4-FFF2-40B4-BE49-F238E27FC236}">
-                <a16:creationId xmlns:a16="http://schemas.microsoft.com/office/drawing/2014/main" id="{986A9FAB-2A87-46B5-985D-8FE71E1C3375}"/>
-              </a:ext>
-            </a:extLst>
-          </p:cNvPr>
-          <p:cNvSpPr/>
-          <p:nvPr/>
-        </p:nvSpPr>
-        <p:spPr>
           <a:xfrm rot="16200000" flipH="1">
-            <a:off x="4605596" y="2529467"/>
+            <a:off x="4605596" y="2418150"/>
             <a:ext cx="164426" cy="159908"/>
           </a:xfrm>
           <a:prstGeom prst="triangle">
@@ -5117,10 +4993,10 @@
       </p:sp>
       <p:sp>
         <p:nvSpPr>
-          <p:cNvPr id="94" name="Isosceles Triangle 102">
-            <a:extLst>
-              <a:ext uri="{FF2B5EF4-FFF2-40B4-BE49-F238E27FC236}">
-                <a16:creationId xmlns:a16="http://schemas.microsoft.com/office/drawing/2014/main" id="{011D6BE4-EEF3-4B05-B085-99F4F41FB29F}"/>
+          <p:cNvPr id="98" name="Rectangle 11">
+            <a:extLst>
+              <a:ext uri="{FF2B5EF4-FFF2-40B4-BE49-F238E27FC236}">
+                <a16:creationId xmlns:a16="http://schemas.microsoft.com/office/drawing/2014/main" id="{51CF34C2-7BF9-4BDC-8AAC-EB1A75F160D4}"/>
               </a:ext>
             </a:extLst>
           </p:cNvPr>
@@ -5128,59 +5004,8 @@
           <p:nvPr/>
         </p:nvSpPr>
         <p:spPr>
-          <a:xfrm rot="16200000" flipH="1">
-            <a:off x="4605596" y="2276531"/>
-            <a:ext cx="164426" cy="159908"/>
-          </a:xfrm>
-          <a:prstGeom prst="triangle">
-            <a:avLst/>
-          </a:prstGeom>
-          <a:ln w="12700"/>
-        </p:spPr>
-        <p:style>
-          <a:lnRef idx="2">
-            <a:schemeClr val="accent5">
-              <a:shade val="50000"/>
-            </a:schemeClr>
-          </a:lnRef>
-          <a:fillRef idx="1">
-            <a:schemeClr val="accent5"/>
-          </a:fillRef>
-          <a:effectRef idx="0">
-            <a:schemeClr val="accent5"/>
-          </a:effectRef>
-          <a:fontRef idx="minor">
-            <a:schemeClr val="lt1"/>
-          </a:fontRef>
-        </p:style>
-        <p:txBody>
-          <a:bodyPr rtlCol="0" anchor="ctr"/>
-          <a:lstStyle/>
-          <a:p>
-            <a:pPr algn="ctr"/>
-            <a:endParaRPr lang="en-SG" sz="1050" b="1">
-              <a:solidFill>
-                <a:srgbClr val="92D050"/>
-              </a:solidFill>
-            </a:endParaRPr>
-          </a:p>
-        </p:txBody>
-      </p:sp>
-      <p:sp>
-        <p:nvSpPr>
-          <p:cNvPr id="98" name="Rectangle 11">
-            <a:extLst>
-              <a:ext uri="{FF2B5EF4-FFF2-40B4-BE49-F238E27FC236}">
-                <a16:creationId xmlns:a16="http://schemas.microsoft.com/office/drawing/2014/main" id="{51CF34C2-7BF9-4BDC-8AAC-EB1A75F160D4}"/>
-              </a:ext>
-            </a:extLst>
-          </p:cNvPr>
-          <p:cNvSpPr/>
-          <p:nvPr/>
-        </p:nvSpPr>
-        <p:spPr>
           <a:xfrm flipH="1">
-            <a:off x="6974476" y="2438824"/>
+            <a:off x="6974476" y="2120773"/>
             <a:ext cx="1261455" cy="346760"/>
           </a:xfrm>
           <a:prstGeom prst="rect">
@@ -5246,7 +5071,7 @@
         </p:nvCxnSpPr>
         <p:spPr>
           <a:xfrm flipV="1">
-            <a:off x="6376948" y="2612204"/>
+            <a:off x="6376948" y="2294153"/>
             <a:ext cx="597528" cy="2419"/>
           </a:xfrm>
           <a:prstGeom prst="bentConnector3">
@@ -5295,7 +5120,7 @@
         </p:nvGrpSpPr>
         <p:grpSpPr>
           <a:xfrm rot="5400000">
-            <a:off x="6594710" y="2471345"/>
+            <a:off x="6594710" y="2153294"/>
             <a:ext cx="222304" cy="598286"/>
             <a:chOff x="3965760" y="592437"/>
             <a:chExt cx="254462" cy="503902"/>
@@ -5404,244 +5229,6 @@
           </p:txBody>
         </p:sp>
       </p:grpSp>
-      <p:sp>
-        <p:nvSpPr>
-          <p:cNvPr id="107" name="Rectangle 11">
-            <a:extLst>
-              <a:ext uri="{FF2B5EF4-FFF2-40B4-BE49-F238E27FC236}">
-                <a16:creationId xmlns:a16="http://schemas.microsoft.com/office/drawing/2014/main" id="{83407174-E9DA-4DFE-A99A-5C66303CAA21}"/>
-              </a:ext>
-            </a:extLst>
-          </p:cNvPr>
-          <p:cNvSpPr/>
-          <p:nvPr/>
-        </p:nvSpPr>
-        <p:spPr>
-          <a:xfrm flipH="1">
-            <a:off x="6982427" y="1826570"/>
-            <a:ext cx="1261455" cy="346760"/>
-          </a:xfrm>
-          <a:prstGeom prst="rect">
-            <a:avLst/>
-          </a:prstGeom>
-          <a:ln w="19050">
-            <a:solidFill>
-              <a:srgbClr val="0070C0"/>
-            </a:solidFill>
-          </a:ln>
-          <a:effectLst/>
-        </p:spPr>
-        <p:style>
-          <a:lnRef idx="1">
-            <a:schemeClr val="accent1"/>
-          </a:lnRef>
-          <a:fillRef idx="2">
-            <a:schemeClr val="accent1"/>
-          </a:fillRef>
-          <a:effectRef idx="1">
-            <a:schemeClr val="accent1"/>
-          </a:effectRef>
-          <a:fontRef idx="minor">
-            <a:schemeClr val="dk1"/>
-          </a:fontRef>
-        </p:style>
-        <p:txBody>
-          <a:bodyPr rtlCol="0" anchor="ctr"/>
-          <a:lstStyle/>
-          <a:p>
-            <a:pPr algn="ctr"/>
-            <a:r>
-              <a:rPr lang="en-US" sz="1050" b="1" dirty="0" err="1">
-                <a:solidFill>
-                  <a:srgbClr val="0070C0"/>
-                </a:solidFill>
-              </a:rPr>
-              <a:t>DeleteNoteCommand</a:t>
-            </a:r>
-            <a:endParaRPr lang="en-SG" sz="1050" b="1" dirty="0">
-              <a:solidFill>
-                <a:srgbClr val="0070C0"/>
-              </a:solidFill>
-            </a:endParaRPr>
-          </a:p>
-        </p:txBody>
-      </p:sp>
-      <p:cxnSp>
-        <p:nvCxnSpPr>
-          <p:cNvPr id="108" name="Elbow Connector 63">
-            <a:extLst>
-              <a:ext uri="{FF2B5EF4-FFF2-40B4-BE49-F238E27FC236}">
-                <a16:creationId xmlns:a16="http://schemas.microsoft.com/office/drawing/2014/main" id="{7943696C-8B0C-433D-B961-A54EF88386D1}"/>
-              </a:ext>
-            </a:extLst>
-          </p:cNvPr>
-          <p:cNvCxnSpPr>
-            <a:cxnSpLocks/>
-            <a:stCxn id="84" idx="1"/>
-            <a:endCxn id="107" idx="3"/>
-          </p:cNvCxnSpPr>
-          <p:nvPr/>
-        </p:nvCxnSpPr>
-        <p:spPr>
-          <a:xfrm flipV="1">
-            <a:off x="6376949" y="1999950"/>
-            <a:ext cx="605478" cy="1251"/>
-          </a:xfrm>
-          <a:prstGeom prst="bentConnector3">
-            <a:avLst>
-              <a:gd name="adj1" fmla="val 50000"/>
-            </a:avLst>
-          </a:prstGeom>
-          <a:ln w="19050">
-            <a:solidFill>
-              <a:schemeClr val="accent5">
-                <a:lumMod val="75000"/>
-              </a:schemeClr>
-            </a:solidFill>
-            <a:prstDash val="sysDot"/>
-            <a:headEnd type="none" w="med" len="med"/>
-            <a:tailEnd type="arrow" w="med" len="med"/>
-          </a:ln>
-          <a:effectLst/>
-        </p:spPr>
-        <p:style>
-          <a:lnRef idx="1">
-            <a:schemeClr val="accent2"/>
-          </a:lnRef>
-          <a:fillRef idx="2">
-            <a:schemeClr val="accent2"/>
-          </a:fillRef>
-          <a:effectRef idx="1">
-            <a:schemeClr val="accent2"/>
-          </a:effectRef>
-          <a:fontRef idx="minor">
-            <a:schemeClr val="dk1"/>
-          </a:fontRef>
-        </p:style>
-      </p:cxnSp>
-      <p:grpSp>
-        <p:nvGrpSpPr>
-          <p:cNvPr id="110" name="Group 109">
-            <a:extLst>
-              <a:ext uri="{FF2B5EF4-FFF2-40B4-BE49-F238E27FC236}">
-                <a16:creationId xmlns:a16="http://schemas.microsoft.com/office/drawing/2014/main" id="{4EF3FE8F-A00A-4EEF-9CAA-2A5F8B2E4A26}"/>
-              </a:ext>
-            </a:extLst>
-          </p:cNvPr>
-          <p:cNvGrpSpPr/>
-          <p:nvPr/>
-        </p:nvGrpSpPr>
-        <p:grpSpPr>
-          <a:xfrm rot="5400000">
-            <a:off x="6602661" y="1835238"/>
-            <a:ext cx="222304" cy="598286"/>
-            <a:chOff x="3965760" y="592437"/>
-            <a:chExt cx="254462" cy="503902"/>
-          </a:xfrm>
-        </p:grpSpPr>
-        <p:sp>
-          <p:nvSpPr>
-            <p:cNvPr id="111" name="TextBox 110">
-              <a:extLst>
-                <a:ext uri="{FF2B5EF4-FFF2-40B4-BE49-F238E27FC236}">
-                  <a16:creationId xmlns:a16="http://schemas.microsoft.com/office/drawing/2014/main" id="{6CD40E9A-8ED4-4024-8264-1D091F4253DC}"/>
-                </a:ext>
-              </a:extLst>
-            </p:cNvPr>
-            <p:cNvSpPr txBox="1"/>
-            <p:nvPr/>
-          </p:nvSpPr>
-          <p:spPr>
-            <a:xfrm rot="16200000">
-              <a:off x="3841040" y="717157"/>
-              <a:ext cx="503902" cy="254462"/>
-            </a:xfrm>
-            <a:prstGeom prst="rect">
-              <a:avLst/>
-            </a:prstGeom>
-            <a:noFill/>
-          </p:spPr>
-          <p:txBody>
-            <a:bodyPr wrap="square" lIns="0" tIns="0" rIns="0" bIns="0" rtlCol="0">
-              <a:noAutofit/>
-            </a:bodyPr>
-            <a:lstStyle/>
-            <a:p>
-              <a:r>
-                <a:rPr lang="en-US" sz="1100" dirty="0">
-                  <a:solidFill>
-                    <a:schemeClr val="accent5">
-                      <a:lumMod val="75000"/>
-                    </a:schemeClr>
-                  </a:solidFill>
-                </a:rPr>
-                <a:t>creates</a:t>
-              </a:r>
-              <a:endParaRPr lang="en-SG" sz="1100" dirty="0">
-                <a:solidFill>
-                  <a:schemeClr val="accent5">
-                    <a:lumMod val="75000"/>
-                  </a:schemeClr>
-                </a:solidFill>
-              </a:endParaRPr>
-            </a:p>
-          </p:txBody>
-        </p:sp>
-        <p:sp>
-          <p:nvSpPr>
-            <p:cNvPr id="113" name="Isosceles Triangle 112">
-              <a:extLst>
-                <a:ext uri="{FF2B5EF4-FFF2-40B4-BE49-F238E27FC236}">
-                  <a16:creationId xmlns:a16="http://schemas.microsoft.com/office/drawing/2014/main" id="{725C9144-60DB-476D-A4A4-B525EAC0837A}"/>
-                </a:ext>
-              </a:extLst>
-            </p:cNvPr>
-            <p:cNvSpPr/>
-            <p:nvPr/>
-          </p:nvSpPr>
-          <p:spPr>
-            <a:xfrm rot="10800000" flipV="1">
-              <a:off x="3995991" y="638321"/>
-              <a:ext cx="132156" cy="79956"/>
-            </a:xfrm>
-            <a:prstGeom prst="triangle">
-              <a:avLst/>
-            </a:prstGeom>
-            <a:solidFill>
-              <a:schemeClr val="accent5">
-                <a:lumMod val="75000"/>
-              </a:schemeClr>
-            </a:solidFill>
-            <a:ln>
-              <a:noFill/>
-            </a:ln>
-          </p:spPr>
-          <p:style>
-            <a:lnRef idx="2">
-              <a:schemeClr val="accent1">
-                <a:shade val="50000"/>
-              </a:schemeClr>
-            </a:lnRef>
-            <a:fillRef idx="1">
-              <a:schemeClr val="accent1"/>
-            </a:fillRef>
-            <a:effectRef idx="0">
-              <a:schemeClr val="accent1"/>
-            </a:effectRef>
-            <a:fontRef idx="minor">
-              <a:schemeClr val="lt1"/>
-            </a:fontRef>
-          </p:style>
-          <p:txBody>
-            <a:bodyPr rtlCol="0" anchor="ctr"/>
-            <a:lstStyle/>
-            <a:p>
-              <a:pPr algn="ctr"/>
-              <a:endParaRPr lang="en-SG"/>
-            </a:p>
-          </p:txBody>
-        </p:sp>
-      </p:grpSp>
       <p:cxnSp>
         <p:nvCxnSpPr>
           <p:cNvPr id="114" name="Elbow Connector 95">
@@ -5660,8 +5247,8 @@
         </p:nvCxnSpPr>
         <p:spPr>
           <a:xfrm rot="16200000" flipV="1">
-            <a:off x="7877277" y="2970858"/>
-            <a:ext cx="1368272" cy="650964"/>
+            <a:off x="7718252" y="2811833"/>
+            <a:ext cx="1686323" cy="650964"/>
           </a:xfrm>
           <a:prstGeom prst="bentConnector2">
             <a:avLst/>
@@ -5686,50 +5273,6 @@
           </a:fontRef>
         </p:style>
       </p:cxnSp>
-      <p:cxnSp>
-        <p:nvCxnSpPr>
-          <p:cNvPr id="115" name="Elbow Connector 95">
-            <a:extLst>
-              <a:ext uri="{FF2B5EF4-FFF2-40B4-BE49-F238E27FC236}">
-                <a16:creationId xmlns:a16="http://schemas.microsoft.com/office/drawing/2014/main" id="{B2C09EFB-24D2-488D-9B26-DD951928BE16}"/>
-              </a:ext>
-            </a:extLst>
-          </p:cNvPr>
-          <p:cNvCxnSpPr>
-            <a:cxnSpLocks/>
-            <a:stCxn id="87" idx="3"/>
-            <a:endCxn id="107" idx="1"/>
-          </p:cNvCxnSpPr>
-          <p:nvPr/>
-        </p:nvCxnSpPr>
-        <p:spPr>
-          <a:xfrm rot="16200000" flipV="1">
-            <a:off x="7575126" y="2668706"/>
-            <a:ext cx="1980526" cy="643013"/>
-          </a:xfrm>
-          <a:prstGeom prst="bentConnector2">
-            <a:avLst/>
-          </a:prstGeom>
-          <a:ln w="19050">
-            <a:headEnd type="none" w="med" len="med"/>
-            <a:tailEnd type="none" w="med" len="med"/>
-          </a:ln>
-        </p:spPr>
-        <p:style>
-          <a:lnRef idx="1">
-            <a:schemeClr val="accent1"/>
-          </a:lnRef>
-          <a:fillRef idx="0">
-            <a:schemeClr val="accent1"/>
-          </a:fillRef>
-          <a:effectRef idx="0">
-            <a:schemeClr val="accent1"/>
-          </a:effectRef>
-          <a:fontRef idx="minor">
-            <a:schemeClr val="tx1"/>
-          </a:fontRef>
-        </p:style>
-      </p:cxnSp>
       <p:sp>
         <p:nvSpPr>
           <p:cNvPr id="120" name="Isosceles Triangle 102">
@@ -5744,7 +5287,7 @@
         </p:nvSpPr>
         <p:spPr>
           <a:xfrm rot="16200000" flipH="1">
-            <a:off x="8224429" y="2633027"/>
+            <a:off x="8224429" y="2330878"/>
             <a:ext cx="164426" cy="159908"/>
           </a:xfrm>
           <a:prstGeom prst="triangle">
@@ -5798,114 +5341,13 @@
         </p:nvCxnSpPr>
         <p:spPr>
           <a:xfrm flipH="1">
-            <a:off x="8234604" y="2712981"/>
-            <a:ext cx="151992" cy="396893"/>
+            <a:off x="8234604" y="2410832"/>
+            <a:ext cx="151992" cy="520499"/>
           </a:xfrm>
           <a:prstGeom prst="bentConnector4">
             <a:avLst>
-              <a:gd name="adj1" fmla="val -108552"/>
-              <a:gd name="adj2" fmla="val 110157"/>
-            </a:avLst>
-          </a:prstGeom>
-          <a:ln>
-            <a:solidFill>
-              <a:schemeClr val="accent5">
-                <a:lumMod val="75000"/>
-              </a:schemeClr>
-            </a:solidFill>
-            <a:prstDash val="sysDot"/>
-          </a:ln>
-        </p:spPr>
-        <p:style>
-          <a:lnRef idx="1">
-            <a:schemeClr val="accent1"/>
-          </a:lnRef>
-          <a:fillRef idx="0">
-            <a:schemeClr val="accent1"/>
-          </a:fillRef>
-          <a:effectRef idx="0">
-            <a:schemeClr val="accent1"/>
-          </a:effectRef>
-          <a:fontRef idx="minor">
-            <a:schemeClr val="tx1"/>
-          </a:fontRef>
-        </p:style>
-      </p:cxnSp>
-      <p:sp>
-        <p:nvSpPr>
-          <p:cNvPr id="128" name="Isosceles Triangle 102">
-            <a:extLst>
-              <a:ext uri="{FF2B5EF4-FFF2-40B4-BE49-F238E27FC236}">
-                <a16:creationId xmlns:a16="http://schemas.microsoft.com/office/drawing/2014/main" id="{7B6AF29F-DDB0-4FF5-B55A-0C14428F9C48}"/>
-              </a:ext>
-            </a:extLst>
-          </p:cNvPr>
-          <p:cNvSpPr/>
-          <p:nvPr/>
-        </p:nvSpPr>
-        <p:spPr>
-          <a:xfrm rot="16200000" flipH="1">
-            <a:off x="8224429" y="2021868"/>
-            <a:ext cx="164426" cy="159908"/>
-          </a:xfrm>
-          <a:prstGeom prst="triangle">
-            <a:avLst/>
-          </a:prstGeom>
-          <a:ln w="12700"/>
-        </p:spPr>
-        <p:style>
-          <a:lnRef idx="2">
-            <a:schemeClr val="accent5">
-              <a:shade val="50000"/>
-            </a:schemeClr>
-          </a:lnRef>
-          <a:fillRef idx="1">
-            <a:schemeClr val="accent5"/>
-          </a:fillRef>
-          <a:effectRef idx="0">
-            <a:schemeClr val="accent5"/>
-          </a:effectRef>
-          <a:fontRef idx="minor">
-            <a:schemeClr val="lt1"/>
-          </a:fontRef>
-        </p:style>
-        <p:txBody>
-          <a:bodyPr rtlCol="0" anchor="ctr"/>
-          <a:lstStyle/>
-          <a:p>
-            <a:pPr algn="ctr"/>
-            <a:endParaRPr lang="en-SG" sz="1050" b="1">
-              <a:solidFill>
-                <a:srgbClr val="92D050"/>
-              </a:solidFill>
-            </a:endParaRPr>
-          </a:p>
-        </p:txBody>
-      </p:sp>
-      <p:cxnSp>
-        <p:nvCxnSpPr>
-          <p:cNvPr id="129" name="Elbow Connector 82">
-            <a:extLst>
-              <a:ext uri="{FF2B5EF4-FFF2-40B4-BE49-F238E27FC236}">
-                <a16:creationId xmlns:a16="http://schemas.microsoft.com/office/drawing/2014/main" id="{CFAAC9EE-D242-4AEE-AF73-93D530788FEB}"/>
-              </a:ext>
-            </a:extLst>
-          </p:cNvPr>
-          <p:cNvCxnSpPr>
-            <a:cxnSpLocks/>
-            <a:stCxn id="128" idx="3"/>
-          </p:cNvCxnSpPr>
-          <p:nvPr/>
-        </p:nvCxnSpPr>
-        <p:spPr>
-          <a:xfrm flipH="1">
-            <a:off x="8242556" y="2101822"/>
-            <a:ext cx="144040" cy="1040276"/>
-          </a:xfrm>
-          <a:prstGeom prst="bentConnector4">
-            <a:avLst>
-              <a:gd name="adj1" fmla="val -114545"/>
-              <a:gd name="adj2" fmla="val 100468"/>
+              <a:gd name="adj1" fmla="val -150403"/>
+              <a:gd name="adj2" fmla="val 106564"/>
             </a:avLst>
           </a:prstGeom>
           <a:ln>

</xml_diff>

<commit_message>
Fix formatting for diagrams
</commit_message>
<xml_diff>
--- a/docs/diagrams/EditNoteFeatureClassDiagram.pptx
+++ b/docs/diagrams/EditNoteFeatureClassDiagram.pptx
@@ -259,9 +259,9 @@
           <a:p>
             <a:fld id="{88BCCB91-3A3D-4479-8B37-F4775CA133B8}" type="datetimeFigureOut">
               <a:rPr lang="en-US" smtClean="0"/>
-              <a:t>10/30/2018</a:t>
+              <a:t>10/31/2018</a:t>
             </a:fld>
-            <a:endParaRPr lang="en-US"/>
+            <a:endParaRPr lang="en-US" dirty="0"/>
           </a:p>
         </p:txBody>
       </p:sp>
@@ -286,7 +286,7 @@
           <a:bodyPr/>
           <a:lstStyle/>
           <a:p>
-            <a:endParaRPr lang="en-US"/>
+            <a:endParaRPr lang="en-US" dirty="0"/>
           </a:p>
         </p:txBody>
       </p:sp>
@@ -315,7 +315,7 @@
               <a:rPr lang="en-US" smtClean="0"/>
               <a:t>‹#›</a:t>
             </a:fld>
-            <a:endParaRPr lang="en-US"/>
+            <a:endParaRPr lang="en-US" dirty="0"/>
           </a:p>
         </p:txBody>
       </p:sp>
@@ -457,9 +457,9 @@
           <a:p>
             <a:fld id="{88BCCB91-3A3D-4479-8B37-F4775CA133B8}" type="datetimeFigureOut">
               <a:rPr lang="en-US" smtClean="0"/>
-              <a:t>10/30/2018</a:t>
+              <a:t>10/31/2018</a:t>
             </a:fld>
-            <a:endParaRPr lang="en-US"/>
+            <a:endParaRPr lang="en-US" dirty="0"/>
           </a:p>
         </p:txBody>
       </p:sp>
@@ -484,7 +484,7 @@
           <a:bodyPr/>
           <a:lstStyle/>
           <a:p>
-            <a:endParaRPr lang="en-US"/>
+            <a:endParaRPr lang="en-US" dirty="0"/>
           </a:p>
         </p:txBody>
       </p:sp>
@@ -513,7 +513,7 @@
               <a:rPr lang="en-US" smtClean="0"/>
               <a:t>‹#›</a:t>
             </a:fld>
-            <a:endParaRPr lang="en-US"/>
+            <a:endParaRPr lang="en-US" dirty="0"/>
           </a:p>
         </p:txBody>
       </p:sp>
@@ -665,9 +665,9 @@
           <a:p>
             <a:fld id="{88BCCB91-3A3D-4479-8B37-F4775CA133B8}" type="datetimeFigureOut">
               <a:rPr lang="en-US" smtClean="0"/>
-              <a:t>10/30/2018</a:t>
+              <a:t>10/31/2018</a:t>
             </a:fld>
-            <a:endParaRPr lang="en-US"/>
+            <a:endParaRPr lang="en-US" dirty="0"/>
           </a:p>
         </p:txBody>
       </p:sp>
@@ -692,7 +692,7 @@
           <a:bodyPr/>
           <a:lstStyle/>
           <a:p>
-            <a:endParaRPr lang="en-US"/>
+            <a:endParaRPr lang="en-US" dirty="0"/>
           </a:p>
         </p:txBody>
       </p:sp>
@@ -721,7 +721,7 @@
               <a:rPr lang="en-US" smtClean="0"/>
               <a:t>‹#›</a:t>
             </a:fld>
-            <a:endParaRPr lang="en-US"/>
+            <a:endParaRPr lang="en-US" dirty="0"/>
           </a:p>
         </p:txBody>
       </p:sp>
@@ -863,9 +863,9 @@
           <a:p>
             <a:fld id="{88BCCB91-3A3D-4479-8B37-F4775CA133B8}" type="datetimeFigureOut">
               <a:rPr lang="en-US" smtClean="0"/>
-              <a:t>10/30/2018</a:t>
+              <a:t>10/31/2018</a:t>
             </a:fld>
-            <a:endParaRPr lang="en-US"/>
+            <a:endParaRPr lang="en-US" dirty="0"/>
           </a:p>
         </p:txBody>
       </p:sp>
@@ -890,7 +890,7 @@
           <a:bodyPr/>
           <a:lstStyle/>
           <a:p>
-            <a:endParaRPr lang="en-US"/>
+            <a:endParaRPr lang="en-US" dirty="0"/>
           </a:p>
         </p:txBody>
       </p:sp>
@@ -919,7 +919,7 @@
               <a:rPr lang="en-US" smtClean="0"/>
               <a:t>‹#›</a:t>
             </a:fld>
-            <a:endParaRPr lang="en-US"/>
+            <a:endParaRPr lang="en-US" dirty="0"/>
           </a:p>
         </p:txBody>
       </p:sp>
@@ -1138,9 +1138,9 @@
           <a:p>
             <a:fld id="{88BCCB91-3A3D-4479-8B37-F4775CA133B8}" type="datetimeFigureOut">
               <a:rPr lang="en-US" smtClean="0"/>
-              <a:t>10/30/2018</a:t>
+              <a:t>10/31/2018</a:t>
             </a:fld>
-            <a:endParaRPr lang="en-US"/>
+            <a:endParaRPr lang="en-US" dirty="0"/>
           </a:p>
         </p:txBody>
       </p:sp>
@@ -1165,7 +1165,7 @@
           <a:bodyPr/>
           <a:lstStyle/>
           <a:p>
-            <a:endParaRPr lang="en-US"/>
+            <a:endParaRPr lang="en-US" dirty="0"/>
           </a:p>
         </p:txBody>
       </p:sp>
@@ -1194,7 +1194,7 @@
               <a:rPr lang="en-US" smtClean="0"/>
               <a:t>‹#›</a:t>
             </a:fld>
-            <a:endParaRPr lang="en-US"/>
+            <a:endParaRPr lang="en-US" dirty="0"/>
           </a:p>
         </p:txBody>
       </p:sp>
@@ -1403,9 +1403,9 @@
           <a:p>
             <a:fld id="{88BCCB91-3A3D-4479-8B37-F4775CA133B8}" type="datetimeFigureOut">
               <a:rPr lang="en-US" smtClean="0"/>
-              <a:t>10/30/2018</a:t>
+              <a:t>10/31/2018</a:t>
             </a:fld>
-            <a:endParaRPr lang="en-US"/>
+            <a:endParaRPr lang="en-US" dirty="0"/>
           </a:p>
         </p:txBody>
       </p:sp>
@@ -1430,7 +1430,7 @@
           <a:bodyPr/>
           <a:lstStyle/>
           <a:p>
-            <a:endParaRPr lang="en-US"/>
+            <a:endParaRPr lang="en-US" dirty="0"/>
           </a:p>
         </p:txBody>
       </p:sp>
@@ -1459,7 +1459,7 @@
               <a:rPr lang="en-US" smtClean="0"/>
               <a:t>‹#›</a:t>
             </a:fld>
-            <a:endParaRPr lang="en-US"/>
+            <a:endParaRPr lang="en-US" dirty="0"/>
           </a:p>
         </p:txBody>
       </p:sp>
@@ -1815,9 +1815,9 @@
           <a:p>
             <a:fld id="{88BCCB91-3A3D-4479-8B37-F4775CA133B8}" type="datetimeFigureOut">
               <a:rPr lang="en-US" smtClean="0"/>
-              <a:t>10/30/2018</a:t>
+              <a:t>10/31/2018</a:t>
             </a:fld>
-            <a:endParaRPr lang="en-US"/>
+            <a:endParaRPr lang="en-US" dirty="0"/>
           </a:p>
         </p:txBody>
       </p:sp>
@@ -1842,7 +1842,7 @@
           <a:bodyPr/>
           <a:lstStyle/>
           <a:p>
-            <a:endParaRPr lang="en-US"/>
+            <a:endParaRPr lang="en-US" dirty="0"/>
           </a:p>
         </p:txBody>
       </p:sp>
@@ -1871,7 +1871,7 @@
               <a:rPr lang="en-US" smtClean="0"/>
               <a:t>‹#›</a:t>
             </a:fld>
-            <a:endParaRPr lang="en-US"/>
+            <a:endParaRPr lang="en-US" dirty="0"/>
           </a:p>
         </p:txBody>
       </p:sp>
@@ -1956,9 +1956,9 @@
           <a:p>
             <a:fld id="{88BCCB91-3A3D-4479-8B37-F4775CA133B8}" type="datetimeFigureOut">
               <a:rPr lang="en-US" smtClean="0"/>
-              <a:t>10/30/2018</a:t>
+              <a:t>10/31/2018</a:t>
             </a:fld>
-            <a:endParaRPr lang="en-US"/>
+            <a:endParaRPr lang="en-US" dirty="0"/>
           </a:p>
         </p:txBody>
       </p:sp>
@@ -1983,7 +1983,7 @@
           <a:bodyPr/>
           <a:lstStyle/>
           <a:p>
-            <a:endParaRPr lang="en-US"/>
+            <a:endParaRPr lang="en-US" dirty="0"/>
           </a:p>
         </p:txBody>
       </p:sp>
@@ -2012,7 +2012,7 @@
               <a:rPr lang="en-US" smtClean="0"/>
               <a:t>‹#›</a:t>
             </a:fld>
-            <a:endParaRPr lang="en-US"/>
+            <a:endParaRPr lang="en-US" dirty="0"/>
           </a:p>
         </p:txBody>
       </p:sp>
@@ -2069,9 +2069,9 @@
           <a:p>
             <a:fld id="{88BCCB91-3A3D-4479-8B37-F4775CA133B8}" type="datetimeFigureOut">
               <a:rPr lang="en-US" smtClean="0"/>
-              <a:t>10/30/2018</a:t>
+              <a:t>10/31/2018</a:t>
             </a:fld>
-            <a:endParaRPr lang="en-US"/>
+            <a:endParaRPr lang="en-US" dirty="0"/>
           </a:p>
         </p:txBody>
       </p:sp>
@@ -2096,7 +2096,7 @@
           <a:bodyPr/>
           <a:lstStyle/>
           <a:p>
-            <a:endParaRPr lang="en-US"/>
+            <a:endParaRPr lang="en-US" dirty="0"/>
           </a:p>
         </p:txBody>
       </p:sp>
@@ -2125,7 +2125,7 @@
               <a:rPr lang="en-US" smtClean="0"/>
               <a:t>‹#›</a:t>
             </a:fld>
-            <a:endParaRPr lang="en-US"/>
+            <a:endParaRPr lang="en-US" dirty="0"/>
           </a:p>
         </p:txBody>
       </p:sp>
@@ -2380,9 +2380,9 @@
           <a:p>
             <a:fld id="{88BCCB91-3A3D-4479-8B37-F4775CA133B8}" type="datetimeFigureOut">
               <a:rPr lang="en-US" smtClean="0"/>
-              <a:t>10/30/2018</a:t>
+              <a:t>10/31/2018</a:t>
             </a:fld>
-            <a:endParaRPr lang="en-US"/>
+            <a:endParaRPr lang="en-US" dirty="0"/>
           </a:p>
         </p:txBody>
       </p:sp>
@@ -2407,7 +2407,7 @@
           <a:bodyPr/>
           <a:lstStyle/>
           <a:p>
-            <a:endParaRPr lang="en-US"/>
+            <a:endParaRPr lang="en-US" dirty="0"/>
           </a:p>
         </p:txBody>
       </p:sp>
@@ -2436,7 +2436,7 @@
               <a:rPr lang="en-US" smtClean="0"/>
               <a:t>‹#›</a:t>
             </a:fld>
-            <a:endParaRPr lang="en-US"/>
+            <a:endParaRPr lang="en-US" dirty="0"/>
           </a:p>
         </p:txBody>
       </p:sp>
@@ -2570,7 +2570,7 @@
             </a:lvl9pPr>
           </a:lstStyle>
           <a:p>
-            <a:endParaRPr lang="en-US"/>
+            <a:endParaRPr lang="en-US" dirty="0"/>
           </a:p>
         </p:txBody>
       </p:sp>
@@ -2668,9 +2668,9 @@
           <a:p>
             <a:fld id="{88BCCB91-3A3D-4479-8B37-F4775CA133B8}" type="datetimeFigureOut">
               <a:rPr lang="en-US" smtClean="0"/>
-              <a:t>10/30/2018</a:t>
+              <a:t>10/31/2018</a:t>
             </a:fld>
-            <a:endParaRPr lang="en-US"/>
+            <a:endParaRPr lang="en-US" dirty="0"/>
           </a:p>
         </p:txBody>
       </p:sp>
@@ -2695,7 +2695,7 @@
           <a:bodyPr/>
           <a:lstStyle/>
           <a:p>
-            <a:endParaRPr lang="en-US"/>
+            <a:endParaRPr lang="en-US" dirty="0"/>
           </a:p>
         </p:txBody>
       </p:sp>
@@ -2724,7 +2724,7 @@
               <a:rPr lang="en-US" smtClean="0"/>
               <a:t>‹#›</a:t>
             </a:fld>
-            <a:endParaRPr lang="en-US"/>
+            <a:endParaRPr lang="en-US" dirty="0"/>
           </a:p>
         </p:txBody>
       </p:sp>
@@ -2909,9 +2909,9 @@
           <a:p>
             <a:fld id="{88BCCB91-3A3D-4479-8B37-F4775CA133B8}" type="datetimeFigureOut">
               <a:rPr lang="en-US" smtClean="0"/>
-              <a:t>10/30/2018</a:t>
+              <a:t>10/31/2018</a:t>
             </a:fld>
-            <a:endParaRPr lang="en-US"/>
+            <a:endParaRPr lang="en-US" dirty="0"/>
           </a:p>
         </p:txBody>
       </p:sp>
@@ -2954,7 +2954,7 @@
             </a:lvl1pPr>
           </a:lstStyle>
           <a:p>
-            <a:endParaRPr lang="en-US"/>
+            <a:endParaRPr lang="en-US" dirty="0"/>
           </a:p>
         </p:txBody>
       </p:sp>
@@ -3001,7 +3001,7 @@
               <a:rPr lang="en-US" smtClean="0"/>
               <a:t>‹#›</a:t>
             </a:fld>
-            <a:endParaRPr lang="en-US"/>
+            <a:endParaRPr lang="en-US" dirty="0"/>
           </a:p>
         </p:txBody>
       </p:sp>
@@ -3423,7 +3423,7 @@
           <a:p>
             <a:pPr algn="ctr"/>
             <a:r>
-              <a:rPr lang="en-US" sz="1050" dirty="0" err="1">
+              <a:rPr lang="en-US" sz="1050" dirty="0">
                 <a:solidFill>
                   <a:schemeClr val="bg1"/>
                 </a:solidFill>
@@ -3479,7 +3479,7 @@
           <a:p>
             <a:pPr algn="ctr"/>
             <a:r>
-              <a:rPr lang="en-US" sz="1050" b="1" dirty="0" err="1">
+              <a:rPr lang="en-US" sz="1050" b="1" dirty="0">
                 <a:solidFill>
                   <a:srgbClr val="0070C0"/>
                 </a:solidFill>
@@ -3538,7 +3538,7 @@
           <a:p>
             <a:pPr algn="ctr"/>
             <a:r>
-              <a:rPr lang="en-US" sz="1050" dirty="0" err="1">
+              <a:rPr lang="en-US" sz="1050" dirty="0">
                 <a:solidFill>
                   <a:schemeClr val="bg1"/>
                 </a:solidFill>
@@ -3768,18 +3768,13 @@
           <a:p>
             <a:pPr algn="ctr"/>
             <a:r>
-              <a:rPr lang="en-US" sz="1050" dirty="0" err="1">
+              <a:rPr lang="en-US" sz="1050" dirty="0">
                 <a:solidFill>
                   <a:schemeClr val="bg1"/>
                 </a:solidFill>
               </a:rPr>
               <a:t>AddressBook</a:t>
             </a:r>
-            <a:endParaRPr lang="en-US" sz="1050" dirty="0">
-              <a:solidFill>
-                <a:schemeClr val="bg1"/>
-              </a:solidFill>
-            </a:endParaRPr>
           </a:p>
           <a:p>
             <a:pPr algn="ctr"/>
@@ -4062,7 +4057,7 @@
             <a:lstStyle/>
             <a:p>
               <a:pPr algn="ctr"/>
-              <a:endParaRPr lang="en-SG"/>
+              <a:endParaRPr lang="en-SG" dirty="0"/>
             </a:p>
           </p:txBody>
         </p:sp>
@@ -4161,7 +4156,7 @@
             <a:lstStyle/>
             <a:p>
               <a:pPr algn="ctr"/>
-              <a:endParaRPr lang="en-SG"/>
+              <a:endParaRPr lang="en-SG" dirty="0"/>
             </a:p>
           </p:txBody>
         </p:sp>
@@ -4292,7 +4287,7 @@
           <a:lstStyle/>
           <a:p>
             <a:pPr algn="ctr"/>
-            <a:endParaRPr lang="en-SG" sz="1050" b="1">
+            <a:endParaRPr lang="en-SG" sz="1050" b="1" dirty="0">
               <a:solidFill>
                 <a:srgbClr val="92D050"/>
               </a:solidFill>
@@ -4494,7 +4489,7 @@
           <a:lstStyle/>
           <a:p>
             <a:pPr algn="ctr"/>
-            <a:endParaRPr lang="en-SG" sz="1050" b="1">
+            <a:endParaRPr lang="en-SG" sz="1050" b="1" dirty="0">
               <a:solidFill>
                 <a:srgbClr val="92D050"/>
               </a:solidFill>
@@ -4602,7 +4597,7 @@
             <a:lstStyle/>
             <a:p>
               <a:pPr algn="ctr"/>
-              <a:endParaRPr lang="en-SG"/>
+              <a:endParaRPr lang="en-SG" dirty="0"/>
             </a:p>
           </p:txBody>
         </p:sp>
@@ -4691,18 +4686,13 @@
           <a:p>
             <a:pPr algn="ctr"/>
             <a:r>
-              <a:rPr lang="en-US" sz="1050" b="1" dirty="0" err="1">
+              <a:rPr lang="en-US" sz="1050" b="1" dirty="0">
                 <a:solidFill>
                   <a:schemeClr val="bg1"/>
                 </a:solidFill>
               </a:rPr>
               <a:t>EditNoteCommand</a:t>
             </a:r>
-            <a:endParaRPr lang="en-US" sz="1050" b="1" dirty="0">
-              <a:solidFill>
-                <a:schemeClr val="bg1"/>
-              </a:solidFill>
-            </a:endParaRPr>
           </a:p>
           <a:p>
             <a:pPr algn="ctr"/>
@@ -4859,18 +4849,13 @@
           <a:p>
             <a:pPr algn="ctr"/>
             <a:r>
-              <a:rPr lang="en-US" sz="1050" b="1" dirty="0" err="1">
+              <a:rPr lang="en-US" sz="1050" b="1" dirty="0">
                 <a:solidFill>
                   <a:schemeClr val="bg1"/>
                 </a:solidFill>
               </a:rPr>
               <a:t>NoteCommand</a:t>
             </a:r>
-            <a:endParaRPr lang="en-US" sz="1050" b="1" dirty="0">
-              <a:solidFill>
-                <a:schemeClr val="bg1"/>
-              </a:solidFill>
-            </a:endParaRPr>
           </a:p>
           <a:p>
             <a:pPr algn="ctr"/>
@@ -4983,7 +4968,7 @@
           <a:lstStyle/>
           <a:p>
             <a:pPr algn="ctr"/>
-            <a:endParaRPr lang="en-SG" sz="1050" b="1">
+            <a:endParaRPr lang="en-SG" sz="1050" b="1" dirty="0">
               <a:solidFill>
                 <a:srgbClr val="92D050"/>
               </a:solidFill>
@@ -5038,7 +5023,7 @@
           <a:p>
             <a:pPr algn="ctr"/>
             <a:r>
-              <a:rPr lang="en-US" sz="1050" b="1" dirty="0" err="1">
+              <a:rPr lang="en-US" sz="1050" b="1" dirty="0">
                 <a:solidFill>
                   <a:srgbClr val="0070C0"/>
                 </a:solidFill>
@@ -5224,7 +5209,7 @@
             <a:lstStyle/>
             <a:p>
               <a:pPr algn="ctr"/>
-              <a:endParaRPr lang="en-SG"/>
+              <a:endParaRPr lang="en-SG" dirty="0"/>
             </a:p>
           </p:txBody>
         </p:sp>
@@ -5316,7 +5301,7 @@
           <a:lstStyle/>
           <a:p>
             <a:pPr algn="ctr"/>
-            <a:endParaRPr lang="en-SG" sz="1050" b="1">
+            <a:endParaRPr lang="en-SG" sz="1050" b="1" dirty="0">
               <a:solidFill>
                 <a:srgbClr val="92D050"/>
               </a:solidFill>

</xml_diff>

<commit_message>
Update UML in DG, intro & undo in UG
</commit_message>
<xml_diff>
--- a/docs/diagrams/EditNoteFeatureClassDiagram.pptx
+++ b/docs/diagrams/EditNoteFeatureClassDiagram.pptx
@@ -259,7 +259,7 @@
           <a:p>
             <a:fld id="{88BCCB91-3A3D-4479-8B37-F4775CA133B8}" type="datetimeFigureOut">
               <a:rPr lang="en-US" smtClean="0"/>
-              <a:t>10/31/2018</a:t>
+              <a:t>11/12/2018</a:t>
             </a:fld>
             <a:endParaRPr lang="en-US" dirty="0"/>
           </a:p>
@@ -457,7 +457,7 @@
           <a:p>
             <a:fld id="{88BCCB91-3A3D-4479-8B37-F4775CA133B8}" type="datetimeFigureOut">
               <a:rPr lang="en-US" smtClean="0"/>
-              <a:t>10/31/2018</a:t>
+              <a:t>11/12/2018</a:t>
             </a:fld>
             <a:endParaRPr lang="en-US" dirty="0"/>
           </a:p>
@@ -665,7 +665,7 @@
           <a:p>
             <a:fld id="{88BCCB91-3A3D-4479-8B37-F4775CA133B8}" type="datetimeFigureOut">
               <a:rPr lang="en-US" smtClean="0"/>
-              <a:t>10/31/2018</a:t>
+              <a:t>11/12/2018</a:t>
             </a:fld>
             <a:endParaRPr lang="en-US" dirty="0"/>
           </a:p>
@@ -863,7 +863,7 @@
           <a:p>
             <a:fld id="{88BCCB91-3A3D-4479-8B37-F4775CA133B8}" type="datetimeFigureOut">
               <a:rPr lang="en-US" smtClean="0"/>
-              <a:t>10/31/2018</a:t>
+              <a:t>11/12/2018</a:t>
             </a:fld>
             <a:endParaRPr lang="en-US" dirty="0"/>
           </a:p>
@@ -1138,7 +1138,7 @@
           <a:p>
             <a:fld id="{88BCCB91-3A3D-4479-8B37-F4775CA133B8}" type="datetimeFigureOut">
               <a:rPr lang="en-US" smtClean="0"/>
-              <a:t>10/31/2018</a:t>
+              <a:t>11/12/2018</a:t>
             </a:fld>
             <a:endParaRPr lang="en-US" dirty="0"/>
           </a:p>
@@ -1403,7 +1403,7 @@
           <a:p>
             <a:fld id="{88BCCB91-3A3D-4479-8B37-F4775CA133B8}" type="datetimeFigureOut">
               <a:rPr lang="en-US" smtClean="0"/>
-              <a:t>10/31/2018</a:t>
+              <a:t>11/12/2018</a:t>
             </a:fld>
             <a:endParaRPr lang="en-US" dirty="0"/>
           </a:p>
@@ -1815,7 +1815,7 @@
           <a:p>
             <a:fld id="{88BCCB91-3A3D-4479-8B37-F4775CA133B8}" type="datetimeFigureOut">
               <a:rPr lang="en-US" smtClean="0"/>
-              <a:t>10/31/2018</a:t>
+              <a:t>11/12/2018</a:t>
             </a:fld>
             <a:endParaRPr lang="en-US" dirty="0"/>
           </a:p>
@@ -1956,7 +1956,7 @@
           <a:p>
             <a:fld id="{88BCCB91-3A3D-4479-8B37-F4775CA133B8}" type="datetimeFigureOut">
               <a:rPr lang="en-US" smtClean="0"/>
-              <a:t>10/31/2018</a:t>
+              <a:t>11/12/2018</a:t>
             </a:fld>
             <a:endParaRPr lang="en-US" dirty="0"/>
           </a:p>
@@ -2069,7 +2069,7 @@
           <a:p>
             <a:fld id="{88BCCB91-3A3D-4479-8B37-F4775CA133B8}" type="datetimeFigureOut">
               <a:rPr lang="en-US" smtClean="0"/>
-              <a:t>10/31/2018</a:t>
+              <a:t>11/12/2018</a:t>
             </a:fld>
             <a:endParaRPr lang="en-US" dirty="0"/>
           </a:p>
@@ -2380,7 +2380,7 @@
           <a:p>
             <a:fld id="{88BCCB91-3A3D-4479-8B37-F4775CA133B8}" type="datetimeFigureOut">
               <a:rPr lang="en-US" smtClean="0"/>
-              <a:t>10/31/2018</a:t>
+              <a:t>11/12/2018</a:t>
             </a:fld>
             <a:endParaRPr lang="en-US" dirty="0"/>
           </a:p>
@@ -2668,7 +2668,7 @@
           <a:p>
             <a:fld id="{88BCCB91-3A3D-4479-8B37-F4775CA133B8}" type="datetimeFigureOut">
               <a:rPr lang="en-US" smtClean="0"/>
-              <a:t>10/31/2018</a:t>
+              <a:t>11/12/2018</a:t>
             </a:fld>
             <a:endParaRPr lang="en-US" dirty="0"/>
           </a:p>
@@ -2909,7 +2909,7 @@
           <a:p>
             <a:fld id="{88BCCB91-3A3D-4479-8B37-F4775CA133B8}" type="datetimeFigureOut">
               <a:rPr lang="en-US" smtClean="0"/>
-              <a:t>10/31/2018</a:t>
+              <a:t>11/12/2018</a:t>
             </a:fld>
             <a:endParaRPr lang="en-US" dirty="0"/>
           </a:p>
@@ -3334,7 +3334,7 @@
         </p:nvSpPr>
         <p:spPr>
           <a:xfrm>
-            <a:off x="2590800" y="922351"/>
+            <a:off x="2609873" y="946938"/>
             <a:ext cx="7084740" cy="3733800"/>
           </a:xfrm>
           <a:prstGeom prst="roundRect">
@@ -3381,72 +3381,13 @@
       </p:sp>
       <p:sp>
         <p:nvSpPr>
-          <p:cNvPr id="3" name="Rectangle 8"/>
-          <p:cNvSpPr/>
-          <p:nvPr/>
-        </p:nvSpPr>
-        <p:spPr>
-          <a:xfrm>
-            <a:off x="2920231" y="1253067"/>
-            <a:ext cx="1093635" cy="346760"/>
-          </a:xfrm>
-          <a:prstGeom prst="rect">
-            <a:avLst/>
-          </a:prstGeom>
-          <a:solidFill>
-            <a:srgbClr val="0070C0"/>
-          </a:solidFill>
-          <a:ln w="19050">
-            <a:solidFill>
-              <a:srgbClr val="0070C0"/>
-            </a:solidFill>
-          </a:ln>
-          <a:effectLst/>
-        </p:spPr>
-        <p:style>
-          <a:lnRef idx="1">
-            <a:schemeClr val="accent2"/>
-          </a:lnRef>
-          <a:fillRef idx="2">
-            <a:schemeClr val="accent2"/>
-          </a:fillRef>
-          <a:effectRef idx="1">
-            <a:schemeClr val="accent2"/>
-          </a:effectRef>
-          <a:fontRef idx="minor">
-            <a:schemeClr val="dk1"/>
-          </a:fontRef>
-        </p:style>
-        <p:txBody>
-          <a:bodyPr rtlCol="0" anchor="ctr"/>
-          <a:lstStyle/>
-          <a:p>
-            <a:pPr algn="ctr"/>
-            <a:r>
-              <a:rPr lang="en-US" sz="1050" dirty="0">
-                <a:solidFill>
-                  <a:schemeClr val="bg1"/>
-                </a:solidFill>
-              </a:rPr>
-              <a:t>CommandResult</a:t>
-            </a:r>
-            <a:endParaRPr lang="en-SG" sz="1050" dirty="0">
-              <a:solidFill>
-                <a:schemeClr val="bg1"/>
-              </a:solidFill>
-            </a:endParaRPr>
-          </a:p>
-        </p:txBody>
-      </p:sp>
-      <p:sp>
-        <p:nvSpPr>
           <p:cNvPr id="4" name="Rectangle 11"/>
           <p:cNvSpPr/>
           <p:nvPr/>
         </p:nvSpPr>
         <p:spPr>
           <a:xfrm flipH="1">
-            <a:off x="6973149" y="2874820"/>
+            <a:off x="5060478" y="3468805"/>
             <a:ext cx="1261455" cy="346760"/>
           </a:xfrm>
           <a:prstGeom prst="rect">
@@ -3494,109 +3435,6 @@
           </a:p>
         </p:txBody>
       </p:sp>
-      <p:sp>
-        <p:nvSpPr>
-          <p:cNvPr id="5" name="Rectangle 62"/>
-          <p:cNvSpPr/>
-          <p:nvPr/>
-        </p:nvSpPr>
-        <p:spPr>
-          <a:xfrm>
-            <a:off x="2932782" y="3583530"/>
-            <a:ext cx="1093635" cy="346760"/>
-          </a:xfrm>
-          <a:prstGeom prst="rect">
-            <a:avLst/>
-          </a:prstGeom>
-          <a:solidFill>
-            <a:srgbClr val="0070C0"/>
-          </a:solidFill>
-          <a:ln w="19050">
-            <a:solidFill>
-              <a:srgbClr val="0070C0"/>
-            </a:solidFill>
-          </a:ln>
-          <a:effectLst/>
-        </p:spPr>
-        <p:style>
-          <a:lnRef idx="1">
-            <a:schemeClr val="accent2"/>
-          </a:lnRef>
-          <a:fillRef idx="2">
-            <a:schemeClr val="accent2"/>
-          </a:fillRef>
-          <a:effectRef idx="1">
-            <a:schemeClr val="accent2"/>
-          </a:effectRef>
-          <a:fontRef idx="minor">
-            <a:schemeClr val="dk1"/>
-          </a:fontRef>
-        </p:style>
-        <p:txBody>
-          <a:bodyPr rtlCol="0" anchor="ctr"/>
-          <a:lstStyle/>
-          <a:p>
-            <a:pPr algn="ctr"/>
-            <a:r>
-              <a:rPr lang="en-US" sz="1050" dirty="0">
-                <a:solidFill>
-                  <a:schemeClr val="bg1"/>
-                </a:solidFill>
-              </a:rPr>
-              <a:t>LogicManager</a:t>
-            </a:r>
-            <a:endParaRPr lang="en-SG" sz="1050" dirty="0">
-              <a:solidFill>
-                <a:schemeClr val="bg1"/>
-              </a:solidFill>
-            </a:endParaRPr>
-          </a:p>
-        </p:txBody>
-      </p:sp>
-      <p:cxnSp>
-        <p:nvCxnSpPr>
-          <p:cNvPr id="6" name="Elbow Connector 63"/>
-          <p:cNvCxnSpPr>
-            <a:stCxn id="12" idx="3"/>
-            <a:endCxn id="3" idx="3"/>
-          </p:cNvCxnSpPr>
-          <p:nvPr/>
-        </p:nvCxnSpPr>
-        <p:spPr>
-          <a:xfrm flipH="1" flipV="1">
-            <a:off x="4013866" y="1426447"/>
-            <a:ext cx="5259050" cy="2895973"/>
-          </a:xfrm>
-          <a:prstGeom prst="bentConnector3">
-            <a:avLst>
-              <a:gd name="adj1" fmla="val -4347"/>
-            </a:avLst>
-          </a:prstGeom>
-          <a:ln w="19050">
-            <a:solidFill>
-              <a:srgbClr val="0070C0"/>
-            </a:solidFill>
-            <a:prstDash val="sysDot"/>
-            <a:headEnd type="none" w="med" len="med"/>
-            <a:tailEnd type="arrow" w="med" len="med"/>
-          </a:ln>
-          <a:effectLst/>
-        </p:spPr>
-        <p:style>
-          <a:lnRef idx="1">
-            <a:schemeClr val="accent2"/>
-          </a:lnRef>
-          <a:fillRef idx="2">
-            <a:schemeClr val="accent2"/>
-          </a:fillRef>
-          <a:effectRef idx="1">
-            <a:schemeClr val="accent2"/>
-          </a:effectRef>
-          <a:fontRef idx="minor">
-            <a:schemeClr val="dk1"/>
-          </a:fontRef>
-        </p:style>
-      </p:cxnSp>
       <p:sp>
         <p:nvSpPr>
           <p:cNvPr id="9" name="Rectangle 65"/>
@@ -3723,72 +3561,6 @@
             <a:endParaRPr lang="en-SG" sz="1050" b="1" dirty="0">
               <a:solidFill>
                 <a:srgbClr val="0070C0"/>
-              </a:solidFill>
-            </a:endParaRPr>
-          </a:p>
-        </p:txBody>
-      </p:sp>
-      <p:sp>
-        <p:nvSpPr>
-          <p:cNvPr id="16" name="Rectangle 62"/>
-          <p:cNvSpPr/>
-          <p:nvPr/>
-        </p:nvSpPr>
-        <p:spPr>
-          <a:xfrm>
-            <a:off x="4389803" y="3554996"/>
-            <a:ext cx="1045323" cy="384497"/>
-          </a:xfrm>
-          <a:prstGeom prst="rect">
-            <a:avLst/>
-          </a:prstGeom>
-          <a:solidFill>
-            <a:schemeClr val="accent5"/>
-          </a:solidFill>
-          <a:ln/>
-          <a:effectLst/>
-        </p:spPr>
-        <p:style>
-          <a:lnRef idx="1">
-            <a:schemeClr val="accent5"/>
-          </a:lnRef>
-          <a:fillRef idx="2">
-            <a:schemeClr val="accent5"/>
-          </a:fillRef>
-          <a:effectRef idx="1">
-            <a:schemeClr val="accent5"/>
-          </a:effectRef>
-          <a:fontRef idx="minor">
-            <a:schemeClr val="dk1"/>
-          </a:fontRef>
-        </p:style>
-        <p:txBody>
-          <a:bodyPr rtlCol="0" anchor="ctr"/>
-          <a:lstStyle/>
-          <a:p>
-            <a:pPr algn="ctr"/>
-            <a:r>
-              <a:rPr lang="en-US" sz="1050" dirty="0">
-                <a:solidFill>
-                  <a:schemeClr val="bg1"/>
-                </a:solidFill>
-              </a:rPr>
-              <a:t>AddressBook</a:t>
-            </a:r>
-          </a:p>
-          <a:p>
-            <a:pPr algn="ctr"/>
-            <a:r>
-              <a:rPr lang="en-US" sz="1050" dirty="0">
-                <a:solidFill>
-                  <a:schemeClr val="bg1"/>
-                </a:solidFill>
-              </a:rPr>
-              <a:t>Parser</a:t>
-            </a:r>
-            <a:endParaRPr lang="en-SG" sz="1050" dirty="0">
-              <a:solidFill>
-                <a:schemeClr val="bg1"/>
               </a:solidFill>
             </a:endParaRPr>
           </a:p>
@@ -3835,412 +3607,6 @@
           </a:fontRef>
         </p:style>
       </p:cxnSp>
-      <p:cxnSp>
-        <p:nvCxnSpPr>
-          <p:cNvPr id="23" name="Straight Arrow Connector 57"/>
-          <p:cNvCxnSpPr>
-            <a:cxnSpLocks/>
-          </p:cNvCxnSpPr>
-          <p:nvPr/>
-        </p:nvCxnSpPr>
-        <p:spPr>
-          <a:xfrm>
-            <a:off x="3543208" y="3930291"/>
-            <a:ext cx="1376" cy="854841"/>
-          </a:xfrm>
-          <a:prstGeom prst="straightConnector1">
-            <a:avLst/>
-          </a:prstGeom>
-          <a:ln w="19050">
-            <a:solidFill>
-              <a:srgbClr val="0070C0"/>
-            </a:solidFill>
-            <a:headEnd type="none" w="med" len="med"/>
-            <a:tailEnd type="arrow" w="med" len="med"/>
-          </a:ln>
-          <a:effectLst/>
-        </p:spPr>
-        <p:style>
-          <a:lnRef idx="1">
-            <a:schemeClr val="accent2"/>
-          </a:lnRef>
-          <a:fillRef idx="2">
-            <a:schemeClr val="accent2"/>
-          </a:fillRef>
-          <a:effectRef idx="1">
-            <a:schemeClr val="accent2"/>
-          </a:effectRef>
-          <a:fontRef idx="minor">
-            <a:schemeClr val="dk1"/>
-          </a:fontRef>
-        </p:style>
-      </p:cxnSp>
-      <p:cxnSp>
-        <p:nvCxnSpPr>
-          <p:cNvPr id="24" name="Elbow Connector 122"/>
-          <p:cNvCxnSpPr/>
-          <p:nvPr/>
-        </p:nvCxnSpPr>
-        <p:spPr>
-          <a:xfrm>
-            <a:off x="2417311" y="2832505"/>
-            <a:ext cx="419548" cy="2860"/>
-          </a:xfrm>
-          <a:prstGeom prst="bentConnector3">
-            <a:avLst>
-              <a:gd name="adj1" fmla="val 50000"/>
-            </a:avLst>
-          </a:prstGeom>
-          <a:ln w="19050">
-            <a:solidFill>
-              <a:schemeClr val="bg1">
-                <a:lumMod val="75000"/>
-              </a:schemeClr>
-            </a:solidFill>
-            <a:prstDash val="sysDot"/>
-            <a:headEnd type="none" w="med" len="med"/>
-            <a:tailEnd type="arrow" w="med" len="med"/>
-          </a:ln>
-          <a:effectLst/>
-        </p:spPr>
-        <p:style>
-          <a:lnRef idx="1">
-            <a:schemeClr val="accent2"/>
-          </a:lnRef>
-          <a:fillRef idx="2">
-            <a:schemeClr val="accent2"/>
-          </a:fillRef>
-          <a:effectRef idx="1">
-            <a:schemeClr val="accent2"/>
-          </a:effectRef>
-          <a:fontRef idx="minor">
-            <a:schemeClr val="dk1"/>
-          </a:fontRef>
-        </p:style>
-      </p:cxnSp>
-      <p:cxnSp>
-        <p:nvCxnSpPr>
-          <p:cNvPr id="25" name="Elbow Connector 63"/>
-          <p:cNvCxnSpPr>
-            <a:cxnSpLocks/>
-            <a:endCxn id="12" idx="1"/>
-          </p:cNvCxnSpPr>
-          <p:nvPr/>
-        </p:nvCxnSpPr>
-        <p:spPr>
-          <a:xfrm>
-            <a:off x="3432120" y="3939492"/>
-            <a:ext cx="5068753" cy="382928"/>
-          </a:xfrm>
-          <a:prstGeom prst="bentConnector3">
-            <a:avLst>
-              <a:gd name="adj1" fmla="val 116"/>
-            </a:avLst>
-          </a:prstGeom>
-          <a:ln w="19050">
-            <a:solidFill>
-              <a:srgbClr val="0070C0"/>
-            </a:solidFill>
-            <a:prstDash val="sysDot"/>
-            <a:headEnd type="none" w="med" len="med"/>
-            <a:tailEnd type="arrow" w="med" len="med"/>
-          </a:ln>
-          <a:effectLst/>
-        </p:spPr>
-        <p:style>
-          <a:lnRef idx="1">
-            <a:schemeClr val="accent2"/>
-          </a:lnRef>
-          <a:fillRef idx="2">
-            <a:schemeClr val="accent2"/>
-          </a:fillRef>
-          <a:effectRef idx="1">
-            <a:schemeClr val="accent2"/>
-          </a:effectRef>
-          <a:fontRef idx="minor">
-            <a:schemeClr val="dk1"/>
-          </a:fontRef>
-        </p:style>
-      </p:cxnSp>
-      <p:grpSp>
-        <p:nvGrpSpPr>
-          <p:cNvPr id="26" name="Group 25"/>
-          <p:cNvGrpSpPr/>
-          <p:nvPr/>
-        </p:nvGrpSpPr>
-        <p:grpSpPr>
-          <a:xfrm>
-            <a:off x="6121400" y="4341168"/>
-            <a:ext cx="889000" cy="230832"/>
-            <a:chOff x="2895600" y="807932"/>
-            <a:chExt cx="889000" cy="230832"/>
-          </a:xfrm>
-        </p:grpSpPr>
-        <p:sp>
-          <p:nvSpPr>
-            <p:cNvPr id="27" name="TextBox 26"/>
-            <p:cNvSpPr txBox="1"/>
-            <p:nvPr/>
-          </p:nvSpPr>
-          <p:spPr>
-            <a:xfrm>
-              <a:off x="2895600" y="807932"/>
-              <a:ext cx="728806" cy="230832"/>
-            </a:xfrm>
-            <a:prstGeom prst="rect">
-              <a:avLst/>
-            </a:prstGeom>
-            <a:noFill/>
-          </p:spPr>
-          <p:txBody>
-            <a:bodyPr wrap="square" lIns="0" tIns="0" rIns="0" bIns="0" rtlCol="0">
-              <a:noAutofit/>
-            </a:bodyPr>
-            <a:lstStyle/>
-            <a:p>
-              <a:pPr algn="r"/>
-              <a:r>
-                <a:rPr lang="en-US" sz="1100" dirty="0">
-                  <a:solidFill>
-                    <a:srgbClr val="0070C0"/>
-                  </a:solidFill>
-                </a:rPr>
-                <a:t>executes</a:t>
-              </a:r>
-              <a:endParaRPr lang="en-SG" sz="1100" dirty="0">
-                <a:solidFill>
-                  <a:srgbClr val="0070C0"/>
-                </a:solidFill>
-              </a:endParaRPr>
-            </a:p>
-          </p:txBody>
-        </p:sp>
-        <p:sp>
-          <p:nvSpPr>
-            <p:cNvPr id="28" name="Isosceles Triangle 27"/>
-            <p:cNvSpPr/>
-            <p:nvPr/>
-          </p:nvSpPr>
-          <p:spPr>
-            <a:xfrm rot="5400000">
-              <a:off x="3683524" y="866776"/>
-              <a:ext cx="125951" cy="76201"/>
-            </a:xfrm>
-            <a:prstGeom prst="triangle">
-              <a:avLst/>
-            </a:prstGeom>
-            <a:solidFill>
-              <a:srgbClr val="0070C0"/>
-            </a:solidFill>
-            <a:ln>
-              <a:noFill/>
-            </a:ln>
-          </p:spPr>
-          <p:style>
-            <a:lnRef idx="2">
-              <a:schemeClr val="accent1">
-                <a:shade val="50000"/>
-              </a:schemeClr>
-            </a:lnRef>
-            <a:fillRef idx="1">
-              <a:schemeClr val="accent1"/>
-            </a:fillRef>
-            <a:effectRef idx="0">
-              <a:schemeClr val="accent1"/>
-            </a:effectRef>
-            <a:fontRef idx="minor">
-              <a:schemeClr val="lt1"/>
-            </a:fontRef>
-          </p:style>
-          <p:txBody>
-            <a:bodyPr rtlCol="0" anchor="ctr"/>
-            <a:lstStyle/>
-            <a:p>
-              <a:pPr algn="ctr"/>
-              <a:endParaRPr lang="en-SG" dirty="0"/>
-            </a:p>
-          </p:txBody>
-        </p:sp>
-      </p:grpSp>
-      <p:grpSp>
-        <p:nvGrpSpPr>
-          <p:cNvPr id="29" name="Group 28"/>
-          <p:cNvGrpSpPr/>
-          <p:nvPr/>
-        </p:nvGrpSpPr>
-        <p:grpSpPr>
-          <a:xfrm>
-            <a:off x="6189110" y="1219200"/>
-            <a:ext cx="868568" cy="230832"/>
-            <a:chOff x="2755838" y="789460"/>
-            <a:chExt cx="868568" cy="230832"/>
-          </a:xfrm>
-        </p:grpSpPr>
-        <p:sp>
-          <p:nvSpPr>
-            <p:cNvPr id="30" name="TextBox 29"/>
-            <p:cNvSpPr txBox="1"/>
-            <p:nvPr/>
-          </p:nvSpPr>
-          <p:spPr>
-            <a:xfrm>
-              <a:off x="2895600" y="789460"/>
-              <a:ext cx="728806" cy="230832"/>
-            </a:xfrm>
-            <a:prstGeom prst="rect">
-              <a:avLst/>
-            </a:prstGeom>
-            <a:noFill/>
-          </p:spPr>
-          <p:txBody>
-            <a:bodyPr wrap="square" lIns="0" tIns="0" rIns="0" bIns="0" rtlCol="0">
-              <a:noAutofit/>
-            </a:bodyPr>
-            <a:lstStyle/>
-            <a:p>
-              <a:r>
-                <a:rPr lang="en-US" sz="1100" dirty="0">
-                  <a:solidFill>
-                    <a:srgbClr val="0070C0"/>
-                  </a:solidFill>
-                </a:rPr>
-                <a:t>produces</a:t>
-              </a:r>
-              <a:endParaRPr lang="en-SG" sz="1100" dirty="0">
-                <a:solidFill>
-                  <a:srgbClr val="0070C0"/>
-                </a:solidFill>
-              </a:endParaRPr>
-            </a:p>
-          </p:txBody>
-        </p:sp>
-        <p:sp>
-          <p:nvSpPr>
-            <p:cNvPr id="31" name="Isosceles Triangle 30"/>
-            <p:cNvSpPr/>
-            <p:nvPr/>
-          </p:nvSpPr>
-          <p:spPr>
-            <a:xfrm rot="16200000" flipH="1">
-              <a:off x="2730963" y="857181"/>
-              <a:ext cx="125951" cy="76201"/>
-            </a:xfrm>
-            <a:prstGeom prst="triangle">
-              <a:avLst/>
-            </a:prstGeom>
-            <a:solidFill>
-              <a:srgbClr val="0070C0"/>
-            </a:solidFill>
-            <a:ln>
-              <a:noFill/>
-            </a:ln>
-          </p:spPr>
-          <p:style>
-            <a:lnRef idx="2">
-              <a:schemeClr val="accent1">
-                <a:shade val="50000"/>
-              </a:schemeClr>
-            </a:lnRef>
-            <a:fillRef idx="1">
-              <a:schemeClr val="accent1"/>
-            </a:fillRef>
-            <a:effectRef idx="0">
-              <a:schemeClr val="accent1"/>
-            </a:effectRef>
-            <a:fontRef idx="minor">
-              <a:schemeClr val="lt1"/>
-            </a:fontRef>
-          </p:style>
-          <p:txBody>
-            <a:bodyPr rtlCol="0" anchor="ctr"/>
-            <a:lstStyle/>
-            <a:p>
-              <a:pPr algn="ctr"/>
-              <a:endParaRPr lang="en-SG" dirty="0"/>
-            </a:p>
-          </p:txBody>
-        </p:sp>
-      </p:grpSp>
-      <p:sp>
-        <p:nvSpPr>
-          <p:cNvPr id="33" name="TextBox 32"/>
-          <p:cNvSpPr txBox="1"/>
-          <p:nvPr/>
-        </p:nvSpPr>
-        <p:spPr>
-          <a:xfrm>
-            <a:off x="4214190" y="3789458"/>
-            <a:ext cx="131116" cy="230832"/>
-          </a:xfrm>
-          <a:prstGeom prst="rect">
-            <a:avLst/>
-          </a:prstGeom>
-          <a:noFill/>
-        </p:spPr>
-        <p:txBody>
-          <a:bodyPr wrap="square" lIns="0" tIns="0" rIns="0" bIns="0" rtlCol="0">
-            <a:noAutofit/>
-          </a:bodyPr>
-          <a:lstStyle/>
-          <a:p>
-            <a:pPr algn="r"/>
-            <a:r>
-              <a:rPr lang="en-US" sz="1100" dirty="0">
-                <a:solidFill>
-                  <a:srgbClr val="0070C0"/>
-                </a:solidFill>
-              </a:rPr>
-              <a:t>1</a:t>
-            </a:r>
-            <a:endParaRPr lang="en-SG" sz="1100" dirty="0">
-              <a:solidFill>
-                <a:srgbClr val="0070C0"/>
-              </a:solidFill>
-            </a:endParaRPr>
-          </a:p>
-        </p:txBody>
-      </p:sp>
-      <p:cxnSp>
-        <p:nvCxnSpPr>
-          <p:cNvPr id="39" name="Elbow Connector 122"/>
-          <p:cNvCxnSpPr/>
-          <p:nvPr/>
-        </p:nvCxnSpPr>
-        <p:spPr>
-          <a:xfrm rot="5400000" flipH="1" flipV="1">
-            <a:off x="2454882" y="2601868"/>
-            <a:ext cx="1969553" cy="2764"/>
-          </a:xfrm>
-          <a:prstGeom prst="bentConnector3">
-            <a:avLst>
-              <a:gd name="adj1" fmla="val 50000"/>
-            </a:avLst>
-          </a:prstGeom>
-          <a:ln w="19050">
-            <a:solidFill>
-              <a:srgbClr val="0070C0"/>
-            </a:solidFill>
-            <a:prstDash val="sysDot"/>
-            <a:headEnd type="none" w="med" len="med"/>
-            <a:tailEnd type="arrow" w="med" len="med"/>
-          </a:ln>
-          <a:effectLst/>
-        </p:spPr>
-        <p:style>
-          <a:lnRef idx="1">
-            <a:schemeClr val="accent2"/>
-          </a:lnRef>
-          <a:fillRef idx="2">
-            <a:schemeClr val="accent2"/>
-          </a:fillRef>
-          <a:effectRef idx="1">
-            <a:schemeClr val="accent2"/>
-          </a:effectRef>
-          <a:fontRef idx="minor">
-            <a:schemeClr val="dk1"/>
-          </a:fontRef>
-        </p:style>
-      </p:cxnSp>
       <p:sp>
         <p:nvSpPr>
           <p:cNvPr id="87" name="Isosceles Triangle 102"/>
@@ -4307,8 +3673,8 @@
         </p:nvCxnSpPr>
         <p:spPr>
           <a:xfrm rot="16200000" flipV="1">
-            <a:off x="8094612" y="3188192"/>
-            <a:ext cx="932276" cy="652291"/>
+            <a:off x="7435269" y="2528850"/>
+            <a:ext cx="338291" cy="2564962"/>
           </a:xfrm>
           <a:prstGeom prst="bentConnector2">
             <a:avLst/>
@@ -4344,9 +3710,9 @@
           <p:nvPr/>
         </p:nvCxnSpPr>
         <p:spPr>
-          <a:xfrm flipV="1">
-            <a:off x="6386191" y="3048200"/>
-            <a:ext cx="586958" cy="1155"/>
+          <a:xfrm>
+            <a:off x="4422218" y="3637753"/>
+            <a:ext cx="638260" cy="4432"/>
           </a:xfrm>
           <a:prstGeom prst="bentConnector3">
             <a:avLst>
@@ -4380,123 +3746,6 @@
           </a:fontRef>
         </p:style>
       </p:cxnSp>
-      <p:sp>
-        <p:nvSpPr>
-          <p:cNvPr id="97" name="Rectangle 96">
-            <a:extLst>
-              <a:ext uri="{FF2B5EF4-FFF2-40B4-BE49-F238E27FC236}">
-                <a16:creationId xmlns:a16="http://schemas.microsoft.com/office/drawing/2014/main" id="{AADE6A0C-89AB-467B-8CEA-5FCF36CE0D21}"/>
-              </a:ext>
-            </a:extLst>
-          </p:cNvPr>
-          <p:cNvSpPr/>
-          <p:nvPr/>
-        </p:nvSpPr>
-        <p:spPr>
-          <a:xfrm flipH="1">
-            <a:off x="3611242" y="2282031"/>
-            <a:ext cx="998702" cy="649300"/>
-          </a:xfrm>
-          <a:prstGeom prst="rect">
-            <a:avLst/>
-          </a:prstGeom>
-          <a:solidFill>
-            <a:schemeClr val="accent5"/>
-          </a:solidFill>
-          <a:ln/>
-          <a:effectLst/>
-        </p:spPr>
-        <p:style>
-          <a:lnRef idx="1">
-            <a:schemeClr val="accent5"/>
-          </a:lnRef>
-          <a:fillRef idx="2">
-            <a:schemeClr val="accent5"/>
-          </a:fillRef>
-          <a:effectRef idx="1">
-            <a:schemeClr val="accent5"/>
-          </a:effectRef>
-          <a:fontRef idx="minor">
-            <a:schemeClr val="dk1"/>
-          </a:fontRef>
-        </p:style>
-        <p:txBody>
-          <a:bodyPr rtlCol="0" anchor="ctr"/>
-          <a:lstStyle/>
-          <a:p>
-            <a:pPr algn="ctr"/>
-            <a:r>
-              <a:rPr lang="en-US" sz="1050" b="1" dirty="0">
-                <a:solidFill>
-                  <a:schemeClr val="bg1"/>
-                </a:solidFill>
-              </a:rPr>
-              <a:t>&lt;&lt;interface&gt;&gt;</a:t>
-            </a:r>
-          </a:p>
-          <a:p>
-            <a:pPr algn="ctr"/>
-            <a:r>
-              <a:rPr lang="en-US" sz="1050" b="1" dirty="0">
-                <a:solidFill>
-                  <a:schemeClr val="bg1"/>
-                </a:solidFill>
-              </a:rPr>
-              <a:t>Parser</a:t>
-            </a:r>
-            <a:endParaRPr lang="en-SG" sz="1050" b="1" dirty="0">
-              <a:solidFill>
-                <a:schemeClr val="bg1"/>
-              </a:solidFill>
-            </a:endParaRPr>
-          </a:p>
-        </p:txBody>
-      </p:sp>
-      <p:sp>
-        <p:nvSpPr>
-          <p:cNvPr id="75" name="Isosceles Triangle 102"/>
-          <p:cNvSpPr/>
-          <p:nvPr/>
-        </p:nvSpPr>
-        <p:spPr>
-          <a:xfrm rot="16200000" flipH="1">
-            <a:off x="4605596" y="2679191"/>
-            <a:ext cx="164426" cy="159908"/>
-          </a:xfrm>
-          <a:prstGeom prst="triangle">
-            <a:avLst/>
-          </a:prstGeom>
-          <a:ln w="12700"/>
-        </p:spPr>
-        <p:style>
-          <a:lnRef idx="2">
-            <a:schemeClr val="accent5">
-              <a:shade val="50000"/>
-            </a:schemeClr>
-          </a:lnRef>
-          <a:fillRef idx="1">
-            <a:schemeClr val="accent5"/>
-          </a:fillRef>
-          <a:effectRef idx="0">
-            <a:schemeClr val="accent5"/>
-          </a:effectRef>
-          <a:fontRef idx="minor">
-            <a:schemeClr val="lt1"/>
-          </a:fontRef>
-        </p:style>
-        <p:txBody>
-          <a:bodyPr rtlCol="0" anchor="ctr"/>
-          <a:lstStyle/>
-          <a:p>
-            <a:pPr algn="ctr"/>
-            <a:endParaRPr lang="en-SG" sz="1050" b="1" dirty="0">
-              <a:solidFill>
-                <a:srgbClr val="92D050"/>
-              </a:solidFill>
-            </a:endParaRPr>
-          </a:p>
-        </p:txBody>
-      </p:sp>
       <p:grpSp>
         <p:nvGrpSpPr>
           <p:cNvPr id="85" name="Group 84"/>
@@ -4505,7 +3754,7 @@
         </p:nvGrpSpPr>
         <p:grpSpPr>
           <a:xfrm rot="5400000">
-            <a:off x="6593383" y="2962999"/>
+            <a:off x="4643261" y="2514695"/>
             <a:ext cx="222304" cy="598286"/>
             <a:chOff x="3965760" y="592437"/>
             <a:chExt cx="254462" cy="503902"/>
@@ -4602,48 +3851,6 @@
           </p:txBody>
         </p:sp>
       </p:grpSp>
-      <p:cxnSp>
-        <p:nvCxnSpPr>
-          <p:cNvPr id="95" name="Straight Connector 94"/>
-          <p:cNvCxnSpPr>
-            <a:cxnSpLocks/>
-            <a:endCxn id="16" idx="1"/>
-          </p:cNvCxnSpPr>
-          <p:nvPr/>
-        </p:nvCxnSpPr>
-        <p:spPr>
-          <a:xfrm>
-            <a:off x="4026417" y="3747244"/>
-            <a:ext cx="363386" cy="1"/>
-          </a:xfrm>
-          <a:prstGeom prst="line">
-            <a:avLst/>
-          </a:prstGeom>
-          <a:ln w="19050">
-            <a:solidFill>
-              <a:srgbClr val="0070C0"/>
-            </a:solidFill>
-            <a:prstDash val="solid"/>
-            <a:headEnd type="none" w="med" len="med"/>
-            <a:tailEnd type="arrow" w="med" len="med"/>
-          </a:ln>
-          <a:effectLst/>
-        </p:spPr>
-        <p:style>
-          <a:lnRef idx="1">
-            <a:schemeClr val="accent2"/>
-          </a:lnRef>
-          <a:fillRef idx="2">
-            <a:schemeClr val="accent2"/>
-          </a:fillRef>
-          <a:effectRef idx="1">
-            <a:schemeClr val="accent2"/>
-          </a:effectRef>
-          <a:fontRef idx="minor">
-            <a:schemeClr val="dk1"/>
-          </a:fontRef>
-        </p:style>
-      </p:cxnSp>
       <p:sp>
         <p:nvSpPr>
           <p:cNvPr id="42" name="Rectangle 11"/>
@@ -4652,7 +3859,7 @@
         </p:nvSpPr>
         <p:spPr>
           <a:xfrm flipH="1">
-            <a:off x="5001007" y="2875975"/>
+            <a:off x="3037034" y="3464373"/>
             <a:ext cx="1385184" cy="346760"/>
           </a:xfrm>
           <a:prstGeom prst="rect">
@@ -4712,95 +3919,6 @@
           </a:p>
         </p:txBody>
       </p:sp>
-      <p:cxnSp>
-        <p:nvCxnSpPr>
-          <p:cNvPr id="51" name="Elbow Connector 50"/>
-          <p:cNvCxnSpPr>
-            <a:cxnSpLocks/>
-            <a:stCxn id="16" idx="3"/>
-            <a:endCxn id="42" idx="2"/>
-          </p:cNvCxnSpPr>
-          <p:nvPr/>
-        </p:nvCxnSpPr>
-        <p:spPr>
-          <a:xfrm flipV="1">
-            <a:off x="5435126" y="3222735"/>
-            <a:ext cx="258473" cy="524510"/>
-          </a:xfrm>
-          <a:prstGeom prst="bentConnector2">
-            <a:avLst/>
-          </a:prstGeom>
-          <a:ln w="19050">
-            <a:solidFill>
-              <a:schemeClr val="accent5">
-                <a:lumMod val="75000"/>
-              </a:schemeClr>
-            </a:solidFill>
-            <a:prstDash val="sysDot"/>
-            <a:headEnd type="none" w="med" len="med"/>
-            <a:tailEnd type="arrow" w="med" len="med"/>
-          </a:ln>
-          <a:effectLst/>
-        </p:spPr>
-        <p:style>
-          <a:lnRef idx="1">
-            <a:schemeClr val="accent2"/>
-          </a:lnRef>
-          <a:fillRef idx="2">
-            <a:schemeClr val="accent2"/>
-          </a:fillRef>
-          <a:effectRef idx="1">
-            <a:schemeClr val="accent2"/>
-          </a:effectRef>
-          <a:fontRef idx="minor">
-            <a:schemeClr val="dk1"/>
-          </a:fontRef>
-        </p:style>
-      </p:cxnSp>
-      <p:cxnSp>
-        <p:nvCxnSpPr>
-          <p:cNvPr id="83" name="Elbow Connector 82"/>
-          <p:cNvCxnSpPr>
-            <a:cxnSpLocks/>
-            <a:stCxn id="75" idx="3"/>
-            <a:endCxn id="42" idx="3"/>
-          </p:cNvCxnSpPr>
-          <p:nvPr/>
-        </p:nvCxnSpPr>
-        <p:spPr>
-          <a:xfrm>
-            <a:off x="4767763" y="2759145"/>
-            <a:ext cx="233244" cy="290210"/>
-          </a:xfrm>
-          <a:prstGeom prst="bentConnector3">
-            <a:avLst>
-              <a:gd name="adj1" fmla="val 50000"/>
-            </a:avLst>
-          </a:prstGeom>
-          <a:ln>
-            <a:solidFill>
-              <a:schemeClr val="accent5">
-                <a:lumMod val="75000"/>
-              </a:schemeClr>
-            </a:solidFill>
-            <a:prstDash val="sysDot"/>
-          </a:ln>
-        </p:spPr>
-        <p:style>
-          <a:lnRef idx="1">
-            <a:schemeClr val="accent1"/>
-          </a:lnRef>
-          <a:fillRef idx="0">
-            <a:schemeClr val="accent1"/>
-          </a:fillRef>
-          <a:effectRef idx="0">
-            <a:schemeClr val="accent1"/>
-          </a:effectRef>
-          <a:fontRef idx="minor">
-            <a:schemeClr val="tx1"/>
-          </a:fontRef>
-        </p:style>
-      </p:cxnSp>
       <p:sp>
         <p:nvSpPr>
           <p:cNvPr id="80" name="Rectangle 11">
@@ -4815,7 +3933,7 @@
         </p:nvSpPr>
         <p:spPr>
           <a:xfrm flipH="1">
-            <a:off x="4985389" y="2123192"/>
+            <a:off x="3040681" y="1536159"/>
             <a:ext cx="1391559" cy="346760"/>
           </a:xfrm>
           <a:prstGeom prst="rect">
@@ -4875,62 +3993,12 @@
           </a:p>
         </p:txBody>
       </p:sp>
-      <p:cxnSp>
-        <p:nvCxnSpPr>
-          <p:cNvPr id="81" name="Elbow Connector 82">
-            <a:extLst>
-              <a:ext uri="{FF2B5EF4-FFF2-40B4-BE49-F238E27FC236}">
-                <a16:creationId xmlns:a16="http://schemas.microsoft.com/office/drawing/2014/main" id="{26621211-FE0B-476C-978A-AEC44AB793EA}"/>
-              </a:ext>
-            </a:extLst>
-          </p:cNvPr>
-          <p:cNvCxnSpPr>
-            <a:cxnSpLocks/>
-            <a:stCxn id="93" idx="3"/>
-            <a:endCxn id="80" idx="3"/>
-          </p:cNvCxnSpPr>
-          <p:nvPr/>
-        </p:nvCxnSpPr>
-        <p:spPr>
-          <a:xfrm flipV="1">
-            <a:off x="4767763" y="2296572"/>
-            <a:ext cx="217626" cy="201532"/>
-          </a:xfrm>
-          <a:prstGeom prst="bentConnector3">
-            <a:avLst>
-              <a:gd name="adj1" fmla="val 50000"/>
-            </a:avLst>
-          </a:prstGeom>
-          <a:ln>
-            <a:solidFill>
-              <a:schemeClr val="accent5">
-                <a:lumMod val="75000"/>
-              </a:schemeClr>
-            </a:solidFill>
-            <a:prstDash val="sysDot"/>
-          </a:ln>
-        </p:spPr>
-        <p:style>
-          <a:lnRef idx="1">
-            <a:schemeClr val="accent1"/>
-          </a:lnRef>
-          <a:fillRef idx="0">
-            <a:schemeClr val="accent1"/>
-          </a:fillRef>
-          <a:effectRef idx="0">
-            <a:schemeClr val="accent1"/>
-          </a:effectRef>
-          <a:fontRef idx="minor">
-            <a:schemeClr val="tx1"/>
-          </a:fontRef>
-        </p:style>
-      </p:cxnSp>
-      <p:sp>
-        <p:nvSpPr>
-          <p:cNvPr id="93" name="Isosceles Triangle 102">
-            <a:extLst>
-              <a:ext uri="{FF2B5EF4-FFF2-40B4-BE49-F238E27FC236}">
-                <a16:creationId xmlns:a16="http://schemas.microsoft.com/office/drawing/2014/main" id="{986A9FAB-2A87-46B5-985D-8FE71E1C3375}"/>
+      <p:sp>
+        <p:nvSpPr>
+          <p:cNvPr id="98" name="Rectangle 11">
+            <a:extLst>
+              <a:ext uri="{FF2B5EF4-FFF2-40B4-BE49-F238E27FC236}">
+                <a16:creationId xmlns:a16="http://schemas.microsoft.com/office/drawing/2014/main" id="{51CF34C2-7BF9-4BDC-8AAC-EB1A75F160D4}"/>
               </a:ext>
             </a:extLst>
           </p:cNvPr>
@@ -4938,59 +4006,8 @@
           <p:nvPr/>
         </p:nvSpPr>
         <p:spPr>
-          <a:xfrm rot="16200000" flipH="1">
-            <a:off x="4605596" y="2418150"/>
-            <a:ext cx="164426" cy="159908"/>
-          </a:xfrm>
-          <a:prstGeom prst="triangle">
-            <a:avLst/>
-          </a:prstGeom>
-          <a:ln w="12700"/>
-        </p:spPr>
-        <p:style>
-          <a:lnRef idx="2">
-            <a:schemeClr val="accent5">
-              <a:shade val="50000"/>
-            </a:schemeClr>
-          </a:lnRef>
-          <a:fillRef idx="1">
-            <a:schemeClr val="accent5"/>
-          </a:fillRef>
-          <a:effectRef idx="0">
-            <a:schemeClr val="accent5"/>
-          </a:effectRef>
-          <a:fontRef idx="minor">
-            <a:schemeClr val="lt1"/>
-          </a:fontRef>
-        </p:style>
-        <p:txBody>
-          <a:bodyPr rtlCol="0" anchor="ctr"/>
-          <a:lstStyle/>
-          <a:p>
-            <a:pPr algn="ctr"/>
-            <a:endParaRPr lang="en-SG" sz="1050" b="1" dirty="0">
-              <a:solidFill>
-                <a:srgbClr val="92D050"/>
-              </a:solidFill>
-            </a:endParaRPr>
-          </a:p>
-        </p:txBody>
-      </p:sp>
-      <p:sp>
-        <p:nvSpPr>
-          <p:cNvPr id="98" name="Rectangle 11">
-            <a:extLst>
-              <a:ext uri="{FF2B5EF4-FFF2-40B4-BE49-F238E27FC236}">
-                <a16:creationId xmlns:a16="http://schemas.microsoft.com/office/drawing/2014/main" id="{51CF34C2-7BF9-4BDC-8AAC-EB1A75F160D4}"/>
-              </a:ext>
-            </a:extLst>
-          </p:cNvPr>
-          <p:cNvSpPr/>
-          <p:nvPr/>
-        </p:nvSpPr>
-        <p:spPr>
           <a:xfrm flipH="1">
-            <a:off x="6974476" y="2120773"/>
+            <a:off x="5060478" y="1539960"/>
             <a:ext cx="1261455" cy="346760"/>
           </a:xfrm>
           <a:prstGeom prst="rect">
@@ -5055,9 +4072,9 @@
           <p:nvPr/>
         </p:nvCxnSpPr>
         <p:spPr>
-          <a:xfrm flipV="1">
-            <a:off x="6376948" y="2294153"/>
-            <a:ext cx="597528" cy="2419"/>
+          <a:xfrm>
+            <a:off x="4432240" y="1709539"/>
+            <a:ext cx="628238" cy="3801"/>
           </a:xfrm>
           <a:prstGeom prst="bentConnector3">
             <a:avLst>
@@ -5105,7 +4122,7 @@
         </p:nvGrpSpPr>
         <p:grpSpPr>
           <a:xfrm rot="5400000">
-            <a:off x="6594710" y="2153294"/>
+            <a:off x="4652672" y="1560662"/>
             <a:ext cx="222304" cy="598286"/>
             <a:chOff x="3965760" y="592437"/>
             <a:chExt cx="254462" cy="503902"/>
@@ -5232,8 +4249,8 @@
         </p:nvCxnSpPr>
         <p:spPr>
           <a:xfrm rot="16200000" flipV="1">
-            <a:off x="7718252" y="2811833"/>
-            <a:ext cx="1686323" cy="650964"/>
+            <a:off x="6470846" y="1564427"/>
+            <a:ext cx="2267136" cy="2564962"/>
           </a:xfrm>
           <a:prstGeom prst="bentConnector2">
             <a:avLst/>
@@ -5271,8 +4288,8 @@
           <p:nvPr/>
         </p:nvSpPr>
         <p:spPr>
-          <a:xfrm rot="16200000" flipH="1">
-            <a:off x="8224429" y="2330878"/>
+          <a:xfrm rot="10800000" flipH="1">
+            <a:off x="5310625" y="1369356"/>
             <a:ext cx="164426" cy="159908"/>
           </a:xfrm>
           <a:prstGeom prst="triangle">
@@ -5320,28 +4337,26 @@
           </p:cNvPr>
           <p:cNvCxnSpPr>
             <a:cxnSpLocks/>
-            <a:stCxn id="120" idx="3"/>
           </p:cNvCxnSpPr>
           <p:nvPr/>
         </p:nvCxnSpPr>
         <p:spPr>
-          <a:xfrm flipH="1">
-            <a:off x="8234604" y="2410832"/>
-            <a:ext cx="151992" cy="520499"/>
+          <a:xfrm flipV="1">
+            <a:off x="2822713" y="3815565"/>
+            <a:ext cx="2464904" cy="333478"/>
           </a:xfrm>
-          <a:prstGeom prst="bentConnector4">
+          <a:prstGeom prst="bentConnector3">
             <a:avLst>
-              <a:gd name="adj1" fmla="val -150403"/>
-              <a:gd name="adj2" fmla="val 106564"/>
+              <a:gd name="adj1" fmla="val 100000"/>
             </a:avLst>
           </a:prstGeom>
-          <a:ln>
+          <a:ln w="19050">
             <a:solidFill>
               <a:schemeClr val="accent5">
                 <a:lumMod val="75000"/>
               </a:schemeClr>
             </a:solidFill>
-            <a:prstDash val="sysDot"/>
+            <a:prstDash val="solid"/>
           </a:ln>
         </p:spPr>
         <p:style>
@@ -5359,6 +4374,789 @@
           </a:fontRef>
         </p:style>
       </p:cxnSp>
+      <p:sp>
+        <p:nvSpPr>
+          <p:cNvPr id="45" name="Rectangle 11">
+            <a:extLst>
+              <a:ext uri="{FF2B5EF4-FFF2-40B4-BE49-F238E27FC236}">
+                <a16:creationId xmlns:a16="http://schemas.microsoft.com/office/drawing/2014/main" id="{3066A5CA-0A40-47A6-9BA3-0FD53E5F1003}"/>
+              </a:ext>
+            </a:extLst>
+          </p:cNvPr>
+          <p:cNvSpPr/>
+          <p:nvPr/>
+        </p:nvSpPr>
+        <p:spPr>
+          <a:xfrm flipH="1">
+            <a:off x="3033846" y="2499583"/>
+            <a:ext cx="1391559" cy="346760"/>
+          </a:xfrm>
+          <a:prstGeom prst="rect">
+            <a:avLst/>
+          </a:prstGeom>
+          <a:solidFill>
+            <a:schemeClr val="accent5">
+              <a:alpha val="81000"/>
+            </a:schemeClr>
+          </a:solidFill>
+          <a:ln/>
+          <a:effectLst/>
+        </p:spPr>
+        <p:style>
+          <a:lnRef idx="1">
+            <a:schemeClr val="accent5"/>
+          </a:lnRef>
+          <a:fillRef idx="2">
+            <a:schemeClr val="accent5"/>
+          </a:fillRef>
+          <a:effectRef idx="1">
+            <a:schemeClr val="accent5"/>
+          </a:effectRef>
+          <a:fontRef idx="minor">
+            <a:schemeClr val="dk1"/>
+          </a:fontRef>
+        </p:style>
+        <p:txBody>
+          <a:bodyPr rtlCol="0" anchor="ctr"/>
+          <a:lstStyle/>
+          <a:p>
+            <a:pPr algn="ctr"/>
+            <a:r>
+              <a:rPr lang="en-US" sz="1050" b="1" dirty="0">
+                <a:solidFill>
+                  <a:schemeClr val="bg1"/>
+                </a:solidFill>
+              </a:rPr>
+              <a:t>DeleteNoteCommand</a:t>
+            </a:r>
+          </a:p>
+          <a:p>
+            <a:pPr algn="ctr"/>
+            <a:r>
+              <a:rPr lang="en-US" sz="1050" b="1" dirty="0">
+                <a:solidFill>
+                  <a:schemeClr val="bg1"/>
+                </a:solidFill>
+              </a:rPr>
+              <a:t>Parser</a:t>
+            </a:r>
+            <a:endParaRPr lang="en-SG" sz="1050" b="1" dirty="0">
+              <a:solidFill>
+                <a:schemeClr val="bg1"/>
+              </a:solidFill>
+            </a:endParaRPr>
+          </a:p>
+        </p:txBody>
+      </p:sp>
+      <p:sp>
+        <p:nvSpPr>
+          <p:cNvPr id="57" name="Rectangle 11">
+            <a:extLst>
+              <a:ext uri="{FF2B5EF4-FFF2-40B4-BE49-F238E27FC236}">
+                <a16:creationId xmlns:a16="http://schemas.microsoft.com/office/drawing/2014/main" id="{946FF660-5D3D-405E-9B34-232556F93895}"/>
+              </a:ext>
+            </a:extLst>
+          </p:cNvPr>
+          <p:cNvSpPr/>
+          <p:nvPr/>
+        </p:nvSpPr>
+        <p:spPr>
+          <a:xfrm flipH="1">
+            <a:off x="5020749" y="2502161"/>
+            <a:ext cx="1391557" cy="346760"/>
+          </a:xfrm>
+          <a:prstGeom prst="rect">
+            <a:avLst/>
+          </a:prstGeom>
+          <a:ln w="19050">
+            <a:solidFill>
+              <a:srgbClr val="0070C0"/>
+            </a:solidFill>
+          </a:ln>
+          <a:effectLst/>
+        </p:spPr>
+        <p:style>
+          <a:lnRef idx="1">
+            <a:schemeClr val="accent1"/>
+          </a:lnRef>
+          <a:fillRef idx="2">
+            <a:schemeClr val="accent1"/>
+          </a:fillRef>
+          <a:effectRef idx="1">
+            <a:schemeClr val="accent1"/>
+          </a:effectRef>
+          <a:fontRef idx="minor">
+            <a:schemeClr val="dk1"/>
+          </a:fontRef>
+        </p:style>
+        <p:txBody>
+          <a:bodyPr rtlCol="0" anchor="ctr"/>
+          <a:lstStyle/>
+          <a:p>
+            <a:pPr algn="ctr"/>
+            <a:r>
+              <a:rPr lang="en-US" sz="1050" b="1" dirty="0">
+                <a:solidFill>
+                  <a:srgbClr val="0070C0"/>
+                </a:solidFill>
+              </a:rPr>
+              <a:t>DeleteNoteCommand</a:t>
+            </a:r>
+            <a:endParaRPr lang="en-SG" sz="1050" b="1" dirty="0">
+              <a:solidFill>
+                <a:srgbClr val="0070C0"/>
+              </a:solidFill>
+            </a:endParaRPr>
+          </a:p>
+        </p:txBody>
+      </p:sp>
+      <p:cxnSp>
+        <p:nvCxnSpPr>
+          <p:cNvPr id="58" name="Elbow Connector 63">
+            <a:extLst>
+              <a:ext uri="{FF2B5EF4-FFF2-40B4-BE49-F238E27FC236}">
+                <a16:creationId xmlns:a16="http://schemas.microsoft.com/office/drawing/2014/main" id="{6506FED1-008F-4ED7-9802-2B21C5ADC37C}"/>
+              </a:ext>
+            </a:extLst>
+          </p:cNvPr>
+          <p:cNvCxnSpPr>
+            <a:cxnSpLocks/>
+            <a:stCxn id="45" idx="1"/>
+            <a:endCxn id="57" idx="3"/>
+          </p:cNvCxnSpPr>
+          <p:nvPr/>
+        </p:nvCxnSpPr>
+        <p:spPr>
+          <a:xfrm>
+            <a:off x="4425405" y="2672963"/>
+            <a:ext cx="595344" cy="2578"/>
+          </a:xfrm>
+          <a:prstGeom prst="bentConnector3">
+            <a:avLst>
+              <a:gd name="adj1" fmla="val 50000"/>
+            </a:avLst>
+          </a:prstGeom>
+          <a:ln w="19050">
+            <a:solidFill>
+              <a:schemeClr val="accent5">
+                <a:lumMod val="75000"/>
+              </a:schemeClr>
+            </a:solidFill>
+            <a:prstDash val="sysDot"/>
+            <a:headEnd type="none" w="med" len="med"/>
+            <a:tailEnd type="arrow" w="med" len="med"/>
+          </a:ln>
+          <a:effectLst/>
+        </p:spPr>
+        <p:style>
+          <a:lnRef idx="1">
+            <a:schemeClr val="accent2"/>
+          </a:lnRef>
+          <a:fillRef idx="2">
+            <a:schemeClr val="accent2"/>
+          </a:fillRef>
+          <a:effectRef idx="1">
+            <a:schemeClr val="accent2"/>
+          </a:effectRef>
+          <a:fontRef idx="minor">
+            <a:schemeClr val="dk1"/>
+          </a:fontRef>
+        </p:style>
+      </p:cxnSp>
+      <p:grpSp>
+        <p:nvGrpSpPr>
+          <p:cNvPr id="61" name="Group 60">
+            <a:extLst>
+              <a:ext uri="{FF2B5EF4-FFF2-40B4-BE49-F238E27FC236}">
+                <a16:creationId xmlns:a16="http://schemas.microsoft.com/office/drawing/2014/main" id="{C17339AC-32F9-432A-9E71-8A1A8AC17768}"/>
+              </a:ext>
+            </a:extLst>
+          </p:cNvPr>
+          <p:cNvGrpSpPr/>
+          <p:nvPr/>
+        </p:nvGrpSpPr>
+        <p:grpSpPr>
+          <a:xfrm rot="5400000">
+            <a:off x="4652672" y="3487726"/>
+            <a:ext cx="222304" cy="598286"/>
+            <a:chOff x="3965760" y="592437"/>
+            <a:chExt cx="254462" cy="503902"/>
+          </a:xfrm>
+        </p:grpSpPr>
+        <p:sp>
+          <p:nvSpPr>
+            <p:cNvPr id="62" name="TextBox 61">
+              <a:extLst>
+                <a:ext uri="{FF2B5EF4-FFF2-40B4-BE49-F238E27FC236}">
+                  <a16:creationId xmlns:a16="http://schemas.microsoft.com/office/drawing/2014/main" id="{5E8713CE-F854-41BC-8A15-9D543968BE08}"/>
+                </a:ext>
+              </a:extLst>
+            </p:cNvPr>
+            <p:cNvSpPr txBox="1"/>
+            <p:nvPr/>
+          </p:nvSpPr>
+          <p:spPr>
+            <a:xfrm rot="16200000">
+              <a:off x="3841040" y="717157"/>
+              <a:ext cx="503902" cy="254462"/>
+            </a:xfrm>
+            <a:prstGeom prst="rect">
+              <a:avLst/>
+            </a:prstGeom>
+            <a:noFill/>
+          </p:spPr>
+          <p:txBody>
+            <a:bodyPr wrap="square" lIns="0" tIns="0" rIns="0" bIns="0" rtlCol="0">
+              <a:noAutofit/>
+            </a:bodyPr>
+            <a:lstStyle/>
+            <a:p>
+              <a:r>
+                <a:rPr lang="en-US" sz="1100" dirty="0">
+                  <a:solidFill>
+                    <a:schemeClr val="accent5">
+                      <a:lumMod val="75000"/>
+                    </a:schemeClr>
+                  </a:solidFill>
+                </a:rPr>
+                <a:t>creates</a:t>
+              </a:r>
+              <a:endParaRPr lang="en-SG" sz="1100" dirty="0">
+                <a:solidFill>
+                  <a:schemeClr val="accent5">
+                    <a:lumMod val="75000"/>
+                  </a:schemeClr>
+                </a:solidFill>
+              </a:endParaRPr>
+            </a:p>
+          </p:txBody>
+        </p:sp>
+        <p:sp>
+          <p:nvSpPr>
+            <p:cNvPr id="63" name="Isosceles Triangle 62">
+              <a:extLst>
+                <a:ext uri="{FF2B5EF4-FFF2-40B4-BE49-F238E27FC236}">
+                  <a16:creationId xmlns:a16="http://schemas.microsoft.com/office/drawing/2014/main" id="{460EC3FC-D7C6-447E-96CA-9A3661A0B722}"/>
+                </a:ext>
+              </a:extLst>
+            </p:cNvPr>
+            <p:cNvSpPr/>
+            <p:nvPr/>
+          </p:nvSpPr>
+          <p:spPr>
+            <a:xfrm rot="10800000" flipV="1">
+              <a:off x="3995991" y="638321"/>
+              <a:ext cx="132156" cy="79956"/>
+            </a:xfrm>
+            <a:prstGeom prst="triangle">
+              <a:avLst/>
+            </a:prstGeom>
+            <a:solidFill>
+              <a:schemeClr val="accent5">
+                <a:lumMod val="75000"/>
+              </a:schemeClr>
+            </a:solidFill>
+            <a:ln>
+              <a:noFill/>
+            </a:ln>
+          </p:spPr>
+          <p:style>
+            <a:lnRef idx="2">
+              <a:schemeClr val="accent1">
+                <a:shade val="50000"/>
+              </a:schemeClr>
+            </a:lnRef>
+            <a:fillRef idx="1">
+              <a:schemeClr val="accent1"/>
+            </a:fillRef>
+            <a:effectRef idx="0">
+              <a:schemeClr val="accent1"/>
+            </a:effectRef>
+            <a:fontRef idx="minor">
+              <a:schemeClr val="lt1"/>
+            </a:fontRef>
+          </p:style>
+          <p:txBody>
+            <a:bodyPr rtlCol="0" anchor="ctr"/>
+            <a:lstStyle/>
+            <a:p>
+              <a:pPr algn="ctr"/>
+              <a:endParaRPr lang="en-SG" dirty="0"/>
+            </a:p>
+          </p:txBody>
+        </p:sp>
+      </p:grpSp>
+      <p:cxnSp>
+        <p:nvCxnSpPr>
+          <p:cNvPr id="71" name="Elbow Connector 82">
+            <a:extLst>
+              <a:ext uri="{FF2B5EF4-FFF2-40B4-BE49-F238E27FC236}">
+                <a16:creationId xmlns:a16="http://schemas.microsoft.com/office/drawing/2014/main" id="{EFBB09E1-683D-46CE-9EBA-1597D9907CF7}"/>
+              </a:ext>
+            </a:extLst>
+          </p:cNvPr>
+          <p:cNvCxnSpPr>
+            <a:cxnSpLocks/>
+          </p:cNvCxnSpPr>
+          <p:nvPr/>
+        </p:nvCxnSpPr>
+        <p:spPr>
+          <a:xfrm rot="5400000" flipH="1" flipV="1">
+            <a:off x="2496713" y="1504334"/>
+            <a:ext cx="2981730" cy="2329733"/>
+          </a:xfrm>
+          <a:prstGeom prst="bentConnector3">
+            <a:avLst>
+              <a:gd name="adj1" fmla="val 100134"/>
+            </a:avLst>
+          </a:prstGeom>
+          <a:ln w="19050">
+            <a:solidFill>
+              <a:schemeClr val="accent5">
+                <a:lumMod val="75000"/>
+              </a:schemeClr>
+            </a:solidFill>
+            <a:prstDash val="solid"/>
+          </a:ln>
+        </p:spPr>
+        <p:style>
+          <a:lnRef idx="1">
+            <a:schemeClr val="accent1"/>
+          </a:lnRef>
+          <a:fillRef idx="0">
+            <a:schemeClr val="accent1"/>
+          </a:fillRef>
+          <a:effectRef idx="0">
+            <a:schemeClr val="accent1"/>
+          </a:effectRef>
+          <a:fontRef idx="minor">
+            <a:schemeClr val="tx1"/>
+          </a:fontRef>
+        </p:style>
+      </p:cxnSp>
+      <p:cxnSp>
+        <p:nvCxnSpPr>
+          <p:cNvPr id="74" name="Elbow Connector 82">
+            <a:extLst>
+              <a:ext uri="{FF2B5EF4-FFF2-40B4-BE49-F238E27FC236}">
+                <a16:creationId xmlns:a16="http://schemas.microsoft.com/office/drawing/2014/main" id="{7B482863-3974-4FDB-9357-70C456FF795E}"/>
+              </a:ext>
+            </a:extLst>
+          </p:cNvPr>
+          <p:cNvCxnSpPr>
+            <a:cxnSpLocks/>
+            <a:endCxn id="120" idx="3"/>
+          </p:cNvCxnSpPr>
+          <p:nvPr/>
+        </p:nvCxnSpPr>
+        <p:spPr>
+          <a:xfrm>
+            <a:off x="5152444" y="1178335"/>
+            <a:ext cx="240394" cy="191021"/>
+          </a:xfrm>
+          <a:prstGeom prst="bentConnector2">
+            <a:avLst/>
+          </a:prstGeom>
+          <a:ln w="19050">
+            <a:solidFill>
+              <a:schemeClr val="accent5">
+                <a:lumMod val="75000"/>
+              </a:schemeClr>
+            </a:solidFill>
+            <a:prstDash val="solid"/>
+          </a:ln>
+        </p:spPr>
+        <p:style>
+          <a:lnRef idx="1">
+            <a:schemeClr val="accent1"/>
+          </a:lnRef>
+          <a:fillRef idx="0">
+            <a:schemeClr val="accent1"/>
+          </a:fillRef>
+          <a:effectRef idx="0">
+            <a:schemeClr val="accent1"/>
+          </a:effectRef>
+          <a:fontRef idx="minor">
+            <a:schemeClr val="tx1"/>
+          </a:fontRef>
+        </p:style>
+      </p:cxnSp>
+      <p:sp>
+        <p:nvSpPr>
+          <p:cNvPr id="78" name="Rectangle 11">
+            <a:extLst>
+              <a:ext uri="{FF2B5EF4-FFF2-40B4-BE49-F238E27FC236}">
+                <a16:creationId xmlns:a16="http://schemas.microsoft.com/office/drawing/2014/main" id="{83EC9BE6-F910-47E6-BAFB-C900FC4CD02B}"/>
+              </a:ext>
+            </a:extLst>
+          </p:cNvPr>
+          <p:cNvSpPr/>
+          <p:nvPr/>
+        </p:nvSpPr>
+        <p:spPr>
+          <a:xfrm flipH="1">
+            <a:off x="6707750" y="2900516"/>
+            <a:ext cx="1689718" cy="334098"/>
+          </a:xfrm>
+          <a:prstGeom prst="rect">
+            <a:avLst/>
+          </a:prstGeom>
+          <a:ln w="19050">
+            <a:solidFill>
+              <a:srgbClr val="0070C0"/>
+            </a:solidFill>
+          </a:ln>
+          <a:effectLst/>
+        </p:spPr>
+        <p:style>
+          <a:lnRef idx="1">
+            <a:schemeClr val="accent1"/>
+          </a:lnRef>
+          <a:fillRef idx="2">
+            <a:schemeClr val="accent1"/>
+          </a:fillRef>
+          <a:effectRef idx="1">
+            <a:schemeClr val="accent1"/>
+          </a:effectRef>
+          <a:fontRef idx="minor">
+            <a:schemeClr val="dk1"/>
+          </a:fontRef>
+        </p:style>
+        <p:txBody>
+          <a:bodyPr rtlCol="0" anchor="ctr"/>
+          <a:lstStyle/>
+          <a:p>
+            <a:pPr algn="ctr"/>
+            <a:r>
+              <a:rPr lang="en-US" sz="1050" b="1" dirty="0">
+                <a:solidFill>
+                  <a:srgbClr val="0070C0"/>
+                </a:solidFill>
+              </a:rPr>
+              <a:t>&lt;&lt;interface&gt;&gt;</a:t>
+            </a:r>
+          </a:p>
+          <a:p>
+            <a:pPr algn="ctr"/>
+            <a:r>
+              <a:rPr lang="en-US" sz="1050" b="1" dirty="0">
+                <a:solidFill>
+                  <a:srgbClr val="0070C0"/>
+                </a:solidFill>
+              </a:rPr>
+              <a:t>NoteDeleter</a:t>
+            </a:r>
+            <a:endParaRPr lang="en-SG" sz="1050" b="1" dirty="0">
+              <a:solidFill>
+                <a:srgbClr val="0070C0"/>
+              </a:solidFill>
+            </a:endParaRPr>
+          </a:p>
+        </p:txBody>
+      </p:sp>
+      <p:cxnSp>
+        <p:nvCxnSpPr>
+          <p:cNvPr id="82" name="Elbow Connector 82">
+            <a:extLst>
+              <a:ext uri="{FF2B5EF4-FFF2-40B4-BE49-F238E27FC236}">
+                <a16:creationId xmlns:a16="http://schemas.microsoft.com/office/drawing/2014/main" id="{BA2DE2D2-19B3-46BC-BBD5-3AE966C9124D}"/>
+              </a:ext>
+            </a:extLst>
+          </p:cNvPr>
+          <p:cNvCxnSpPr>
+            <a:cxnSpLocks/>
+            <a:stCxn id="4" idx="0"/>
+            <a:endCxn id="78" idx="3"/>
+          </p:cNvCxnSpPr>
+          <p:nvPr/>
+        </p:nvCxnSpPr>
+        <p:spPr>
+          <a:xfrm rot="5400000" flipH="1" flipV="1">
+            <a:off x="5998857" y="2759913"/>
+            <a:ext cx="401240" cy="1016545"/>
+          </a:xfrm>
+          <a:prstGeom prst="bentConnector2">
+            <a:avLst/>
+          </a:prstGeom>
+          <a:ln w="19050">
+            <a:solidFill>
+              <a:schemeClr val="accent5">
+                <a:lumMod val="75000"/>
+              </a:schemeClr>
+            </a:solidFill>
+            <a:prstDash val="dash"/>
+          </a:ln>
+        </p:spPr>
+        <p:style>
+          <a:lnRef idx="1">
+            <a:schemeClr val="accent1"/>
+          </a:lnRef>
+          <a:fillRef idx="0">
+            <a:schemeClr val="accent1"/>
+          </a:fillRef>
+          <a:effectRef idx="0">
+            <a:schemeClr val="accent1"/>
+          </a:effectRef>
+          <a:fontRef idx="minor">
+            <a:schemeClr val="tx1"/>
+          </a:fontRef>
+        </p:style>
+      </p:cxnSp>
+      <p:cxnSp>
+        <p:nvCxnSpPr>
+          <p:cNvPr id="84" name="Elbow Connector 82">
+            <a:extLst>
+              <a:ext uri="{FF2B5EF4-FFF2-40B4-BE49-F238E27FC236}">
+                <a16:creationId xmlns:a16="http://schemas.microsoft.com/office/drawing/2014/main" id="{5C9B5952-892F-4034-BEEE-449A4D925797}"/>
+              </a:ext>
+            </a:extLst>
+          </p:cNvPr>
+          <p:cNvCxnSpPr>
+            <a:cxnSpLocks/>
+            <a:endCxn id="78" idx="3"/>
+          </p:cNvCxnSpPr>
+          <p:nvPr/>
+        </p:nvCxnSpPr>
+        <p:spPr>
+          <a:xfrm>
+            <a:off x="5691204" y="2772547"/>
+            <a:ext cx="1016546" cy="295018"/>
+          </a:xfrm>
+          <a:prstGeom prst="bentConnector3">
+            <a:avLst>
+              <a:gd name="adj1" fmla="val -296"/>
+            </a:avLst>
+          </a:prstGeom>
+          <a:ln w="19050">
+            <a:solidFill>
+              <a:schemeClr val="accent5">
+                <a:lumMod val="75000"/>
+              </a:schemeClr>
+            </a:solidFill>
+            <a:prstDash val="dash"/>
+          </a:ln>
+        </p:spPr>
+        <p:style>
+          <a:lnRef idx="1">
+            <a:schemeClr val="accent1"/>
+          </a:lnRef>
+          <a:fillRef idx="0">
+            <a:schemeClr val="accent1"/>
+          </a:fillRef>
+          <a:effectRef idx="0">
+            <a:schemeClr val="accent1"/>
+          </a:effectRef>
+          <a:fontRef idx="minor">
+            <a:schemeClr val="tx1"/>
+          </a:fontRef>
+        </p:style>
+      </p:cxnSp>
+      <p:sp>
+        <p:nvSpPr>
+          <p:cNvPr id="88" name="Isosceles Triangle 102">
+            <a:extLst>
+              <a:ext uri="{FF2B5EF4-FFF2-40B4-BE49-F238E27FC236}">
+                <a16:creationId xmlns:a16="http://schemas.microsoft.com/office/drawing/2014/main" id="{CCD7A808-127B-4E7E-AC05-A53E9AE824B2}"/>
+              </a:ext>
+            </a:extLst>
+          </p:cNvPr>
+          <p:cNvSpPr/>
+          <p:nvPr/>
+        </p:nvSpPr>
+        <p:spPr>
+          <a:xfrm rot="5199312" flipH="1">
+            <a:off x="6536256" y="2985608"/>
+            <a:ext cx="164426" cy="159908"/>
+          </a:xfrm>
+          <a:prstGeom prst="triangle">
+            <a:avLst/>
+          </a:prstGeom>
+          <a:ln w="12700"/>
+        </p:spPr>
+        <p:style>
+          <a:lnRef idx="2">
+            <a:schemeClr val="accent5">
+              <a:shade val="50000"/>
+            </a:schemeClr>
+          </a:lnRef>
+          <a:fillRef idx="1">
+            <a:schemeClr val="accent5"/>
+          </a:fillRef>
+          <a:effectRef idx="0">
+            <a:schemeClr val="accent5"/>
+          </a:effectRef>
+          <a:fontRef idx="minor">
+            <a:schemeClr val="lt1"/>
+          </a:fontRef>
+        </p:style>
+        <p:txBody>
+          <a:bodyPr rtlCol="0" anchor="ctr"/>
+          <a:lstStyle/>
+          <a:p>
+            <a:pPr algn="ctr"/>
+            <a:endParaRPr lang="en-SG" sz="1050" b="1" dirty="0">
+              <a:solidFill>
+                <a:srgbClr val="92D050"/>
+              </a:solidFill>
+            </a:endParaRPr>
+          </a:p>
+        </p:txBody>
+      </p:sp>
+      <p:cxnSp>
+        <p:nvCxnSpPr>
+          <p:cNvPr id="90" name="Elbow Connector 95">
+            <a:extLst>
+              <a:ext uri="{FF2B5EF4-FFF2-40B4-BE49-F238E27FC236}">
+                <a16:creationId xmlns:a16="http://schemas.microsoft.com/office/drawing/2014/main" id="{865ADB4A-113A-42C6-ADF1-2C8D43E836A0}"/>
+              </a:ext>
+            </a:extLst>
+          </p:cNvPr>
+          <p:cNvCxnSpPr>
+            <a:cxnSpLocks/>
+            <a:stCxn id="87" idx="3"/>
+            <a:endCxn id="57" idx="1"/>
+          </p:cNvCxnSpPr>
+          <p:nvPr/>
+        </p:nvCxnSpPr>
+        <p:spPr>
+          <a:xfrm rot="16200000" flipV="1">
+            <a:off x="6997134" y="2090714"/>
+            <a:ext cx="1304935" cy="2474589"/>
+          </a:xfrm>
+          <a:prstGeom prst="bentConnector2">
+            <a:avLst/>
+          </a:prstGeom>
+          <a:ln w="19050">
+            <a:headEnd type="none" w="med" len="med"/>
+            <a:tailEnd type="none" w="med" len="med"/>
+          </a:ln>
+        </p:spPr>
+        <p:style>
+          <a:lnRef idx="1">
+            <a:schemeClr val="accent1"/>
+          </a:lnRef>
+          <a:fillRef idx="0">
+            <a:schemeClr val="accent1"/>
+          </a:fillRef>
+          <a:effectRef idx="0">
+            <a:schemeClr val="accent1"/>
+          </a:effectRef>
+          <a:fontRef idx="minor">
+            <a:schemeClr val="tx1"/>
+          </a:fontRef>
+        </p:style>
+      </p:cxnSp>
+      <p:sp>
+        <p:nvSpPr>
+          <p:cNvPr id="94" name="Rectangle 11">
+            <a:extLst>
+              <a:ext uri="{FF2B5EF4-FFF2-40B4-BE49-F238E27FC236}">
+                <a16:creationId xmlns:a16="http://schemas.microsoft.com/office/drawing/2014/main" id="{144D6E28-AA36-4234-A7D9-16A5B448A408}"/>
+              </a:ext>
+            </a:extLst>
+          </p:cNvPr>
+          <p:cNvSpPr/>
+          <p:nvPr/>
+        </p:nvSpPr>
+        <p:spPr>
+          <a:xfrm flipH="1">
+            <a:off x="6703080" y="3239086"/>
+            <a:ext cx="1689718" cy="80163"/>
+          </a:xfrm>
+          <a:prstGeom prst="rect">
+            <a:avLst/>
+          </a:prstGeom>
+          <a:ln w="19050">
+            <a:solidFill>
+              <a:srgbClr val="0070C0"/>
+            </a:solidFill>
+          </a:ln>
+          <a:effectLst/>
+        </p:spPr>
+        <p:style>
+          <a:lnRef idx="1">
+            <a:schemeClr val="accent1"/>
+          </a:lnRef>
+          <a:fillRef idx="2">
+            <a:schemeClr val="accent1"/>
+          </a:fillRef>
+          <a:effectRef idx="1">
+            <a:schemeClr val="accent1"/>
+          </a:effectRef>
+          <a:fontRef idx="minor">
+            <a:schemeClr val="dk1"/>
+          </a:fontRef>
+        </p:style>
+        <p:txBody>
+          <a:bodyPr rtlCol="0" anchor="ctr"/>
+          <a:lstStyle/>
+          <a:p>
+            <a:pPr algn="ctr"/>
+            <a:endParaRPr lang="en-US" sz="1050" b="1" dirty="0">
+              <a:solidFill>
+                <a:srgbClr val="0070C0"/>
+              </a:solidFill>
+            </a:endParaRPr>
+          </a:p>
+        </p:txBody>
+      </p:sp>
+      <p:sp>
+        <p:nvSpPr>
+          <p:cNvPr id="101" name="Rectangle 11">
+            <a:extLst>
+              <a:ext uri="{FF2B5EF4-FFF2-40B4-BE49-F238E27FC236}">
+                <a16:creationId xmlns:a16="http://schemas.microsoft.com/office/drawing/2014/main" id="{BFF0A60F-2CFC-4C9D-B75E-E56103E79073}"/>
+              </a:ext>
+            </a:extLst>
+          </p:cNvPr>
+          <p:cNvSpPr/>
+          <p:nvPr/>
+        </p:nvSpPr>
+        <p:spPr>
+          <a:xfrm flipH="1">
+            <a:off x="6707995" y="3325679"/>
+            <a:ext cx="1684803" cy="220080"/>
+          </a:xfrm>
+          <a:prstGeom prst="rect">
+            <a:avLst/>
+          </a:prstGeom>
+          <a:ln w="19050">
+            <a:solidFill>
+              <a:srgbClr val="0070C0"/>
+            </a:solidFill>
+          </a:ln>
+          <a:effectLst/>
+        </p:spPr>
+        <p:style>
+          <a:lnRef idx="1">
+            <a:schemeClr val="accent1"/>
+          </a:lnRef>
+          <a:fillRef idx="2">
+            <a:schemeClr val="accent1"/>
+          </a:fillRef>
+          <a:effectRef idx="1">
+            <a:schemeClr val="accent1"/>
+          </a:effectRef>
+          <a:fontRef idx="minor">
+            <a:schemeClr val="dk1"/>
+          </a:fontRef>
+        </p:style>
+        <p:txBody>
+          <a:bodyPr rtlCol="0" anchor="ctr"/>
+          <a:lstStyle/>
+          <a:p>
+            <a:pPr algn="ctr"/>
+            <a:r>
+              <a:rPr lang="en-US" sz="1050" b="1" dirty="0">
+                <a:solidFill>
+                  <a:srgbClr val="0070C0"/>
+                </a:solidFill>
+              </a:rPr>
+              <a:t>copyWithoutNote(Person)</a:t>
+            </a:r>
+          </a:p>
+        </p:txBody>
+      </p:sp>
     </p:spTree>
     <p:extLst>
       <p:ext uri="{BB962C8B-B14F-4D97-AF65-F5344CB8AC3E}">

</xml_diff>